<commit_message>
Added Transitions & Animation to the Completed Slides
The Animations may be a little, too much, however I like using them as a
means to slowly feed information to our audience so they don't go
reading ahead.
</commit_message>
<xml_diff>
--- a/I Choose You.pptx
+++ b/I Choose You.pptx
@@ -13,8 +13,8 @@
   <p:sldIdLst>
     <p:sldId id="265" r:id="rId3"/>
     <p:sldId id="266" r:id="rId4"/>
-    <p:sldId id="268" r:id="rId5"/>
-    <p:sldId id="267" r:id="rId6"/>
+    <p:sldId id="267" r:id="rId5"/>
+    <p:sldId id="268" r:id="rId6"/>
     <p:sldId id="269" r:id="rId7"/>
     <p:sldId id="270" r:id="rId8"/>
   </p:sldIdLst>
@@ -1227,12 +1227,12 @@
     </dgm:pt>
   </dgm:ptLst>
   <dgm:cxnLst>
+    <dgm:cxn modelId="{5A70FA4A-195D-4B31-AA86-3DC5D1C2EC98}" type="presOf" srcId="{60CDF8D0-D4FC-4467-A51E-79C5A58B0B2C}" destId="{F4B3DB09-8D8A-4833-A3A0-C8C2FB6EE995}" srcOrd="0" destOrd="0" presId="urn:microsoft.com/office/officeart/2005/8/layout/target1"/>
+    <dgm:cxn modelId="{1339090C-9A95-4C05-841C-FA3AF987601B}" srcId="{3F442EA2-39BA-4C9A-AD59-755D4917D532}" destId="{3929B1E1-4BC4-4C73-ABE8-27CEF96A3652}" srcOrd="1" destOrd="0" parTransId="{F356CC76-9117-4B79-A270-BBBAFD3E9C79}" sibTransId="{19BA0C22-38BB-4E9F-89D5-0FF5FF9F12CE}"/>
     <dgm:cxn modelId="{7A4B474F-94DE-4C9D-BBC3-D696C78BEEF1}" type="presOf" srcId="{3929B1E1-4BC4-4C73-ABE8-27CEF96A3652}" destId="{CEA4BEA9-01EB-4151-A2FD-98FDADE4D4C5}" srcOrd="0" destOrd="0" presId="urn:microsoft.com/office/officeart/2005/8/layout/target1"/>
+    <dgm:cxn modelId="{7540B0A9-79C0-422C-9A30-1FFC79A03107}" type="presOf" srcId="{3F442EA2-39BA-4C9A-AD59-755D4917D532}" destId="{AA67F66C-F4E3-4AE3-9C55-A9DF49CFA6B2}" srcOrd="0" destOrd="0" presId="urn:microsoft.com/office/officeart/2005/8/layout/target1"/>
     <dgm:cxn modelId="{EBD8BE8D-6018-43E2-B081-034BB5656EB6}" srcId="{3F442EA2-39BA-4C9A-AD59-755D4917D532}" destId="{4DF9FE7B-F642-4898-A360-D4E3814E1A3D}" srcOrd="0" destOrd="0" parTransId="{1C10F06D-860A-4604-A7AD-02E614FE3976}" sibTransId="{43C18EFF-81FC-4D70-8C6B-E95FF3730413}"/>
-    <dgm:cxn modelId="{1339090C-9A95-4C05-841C-FA3AF987601B}" srcId="{3F442EA2-39BA-4C9A-AD59-755D4917D532}" destId="{3929B1E1-4BC4-4C73-ABE8-27CEF96A3652}" srcOrd="1" destOrd="0" parTransId="{F356CC76-9117-4B79-A270-BBBAFD3E9C79}" sibTransId="{19BA0C22-38BB-4E9F-89D5-0FF5FF9F12CE}"/>
-    <dgm:cxn modelId="{5A70FA4A-195D-4B31-AA86-3DC5D1C2EC98}" type="presOf" srcId="{60CDF8D0-D4FC-4467-A51E-79C5A58B0B2C}" destId="{F4B3DB09-8D8A-4833-A3A0-C8C2FB6EE995}" srcOrd="0" destOrd="0" presId="urn:microsoft.com/office/officeart/2005/8/layout/target1"/>
     <dgm:cxn modelId="{21A6251B-C0F9-4719-8ECF-31915EFD814C}" type="presOf" srcId="{4DF9FE7B-F642-4898-A360-D4E3814E1A3D}" destId="{721C4484-2C4E-47CE-9E3D-C44F02A7E166}" srcOrd="0" destOrd="0" presId="urn:microsoft.com/office/officeart/2005/8/layout/target1"/>
-    <dgm:cxn modelId="{7540B0A9-79C0-422C-9A30-1FFC79A03107}" type="presOf" srcId="{3F442EA2-39BA-4C9A-AD59-755D4917D532}" destId="{AA67F66C-F4E3-4AE3-9C55-A9DF49CFA6B2}" srcOrd="0" destOrd="0" presId="urn:microsoft.com/office/officeart/2005/8/layout/target1"/>
     <dgm:cxn modelId="{2BA65DEC-E719-4ED3-8135-48349D42DD04}" srcId="{3F442EA2-39BA-4C9A-AD59-755D4917D532}" destId="{60CDF8D0-D4FC-4467-A51E-79C5A58B0B2C}" srcOrd="2" destOrd="0" parTransId="{E12A269F-AB82-486A-9077-80F2BBBE48C2}" sibTransId="{3F7FD59D-A716-4310-A89A-AB6F740D9FFF}"/>
     <dgm:cxn modelId="{6B8A0600-2F3C-4C1C-BB0C-35E13595CB36}" type="presParOf" srcId="{AA67F66C-F4E3-4AE3-9C55-A9DF49CFA6B2}" destId="{CBC7FCC3-4508-4A2C-A699-80B56AC4DB56}" srcOrd="0" destOrd="0" presId="urn:microsoft.com/office/officeart/2005/8/layout/target1"/>
     <dgm:cxn modelId="{CD986D54-F397-4C00-B589-80D8AA5D9D7E}" type="presParOf" srcId="{AA67F66C-F4E3-4AE3-9C55-A9DF49CFA6B2}" destId="{721C4484-2C4E-47CE-9E3D-C44F02A7E166}" srcOrd="1" destOrd="0" presId="urn:microsoft.com/office/officeart/2005/8/layout/target1"/>
@@ -4760,11 +4760,7 @@
             </a:r>
             <a:r>
               <a:rPr lang="en-US" baseline="0" dirty="0" smtClean="0"/>
-              <a:t> </a:t>
-            </a:r>
-            <a:r>
-              <a:rPr lang="en-US" baseline="0" dirty="0" smtClean="0"/>
-              <a:t>you factor only teams of unique Pokémon with unique move-sets, we have (719 choose 6) * (74 choose 4)</a:t>
+              <a:t> you factor only teams of unique Pokémon with unique move-sets, we have (719 choose 6) * (74 choose 4)</a:t>
             </a:r>
           </a:p>
           <a:p>
@@ -4944,214 +4940,8 @@
           <a:p>
             <a:r>
               <a:rPr lang="en-US" dirty="0" smtClean="0"/>
-              <a:t>Rob Speak: </a:t>
-            </a:r>
-          </a:p>
-          <a:p>
-            <a:endParaRPr lang="en-US" dirty="0" smtClean="0"/>
-          </a:p>
-          <a:p>
-            <a:r>
-              <a:rPr lang="en-US" dirty="0" smtClean="0"/>
-              <a:t>We</a:t>
-            </a:r>
-            <a:r>
-              <a:rPr lang="en-US" baseline="0" dirty="0" smtClean="0"/>
-              <a:t> </a:t>
-            </a:r>
-            <a:r>
-              <a:rPr lang="en-US" baseline="0" dirty="0" smtClean="0"/>
-              <a:t>obtained our Pokémon data from two sources. Serebii.net and Smogon.com</a:t>
-            </a:r>
-          </a:p>
-          <a:p>
-            <a:endParaRPr lang="en-US" baseline="0" dirty="0" smtClean="0"/>
-          </a:p>
-          <a:p>
-            <a:pPr marL="171450" indent="-171450">
-              <a:buFont typeface="Arial" panose="020B0604020202020204" pitchFamily="34" charset="0"/>
-              <a:buChar char="•"/>
-            </a:pPr>
-            <a:r>
-              <a:rPr lang="en-US" baseline="0" dirty="0" smtClean="0"/>
-              <a:t>Serebii is a very popular source of Pokémon information, containing a massive database of all Pokémon, attacks, abilities and </a:t>
-            </a:r>
-            <a:r>
-              <a:rPr lang="en-US" baseline="0" dirty="0" smtClean="0"/>
-              <a:t>items</a:t>
-            </a:r>
-          </a:p>
-          <a:p>
-            <a:pPr marL="628650" lvl="1" indent="-171450">
-              <a:buFont typeface="Arial" panose="020B0604020202020204" pitchFamily="34" charset="0"/>
-              <a:buChar char="•"/>
-            </a:pPr>
-            <a:r>
-              <a:rPr lang="en-US" baseline="0" dirty="0" smtClean="0"/>
-              <a:t>We were able to scrape through Serebii to gather all the </a:t>
-            </a:r>
-            <a:r>
-              <a:rPr lang="en-US" baseline="0" dirty="0" err="1" smtClean="0"/>
-              <a:t>staticall</a:t>
-            </a:r>
-            <a:r>
-              <a:rPr lang="en-US" baseline="0" dirty="0" smtClean="0"/>
-              <a:t> data that we needed for our battle simulator. </a:t>
-            </a:r>
-            <a:endParaRPr lang="en-US" baseline="0" dirty="0" smtClean="0"/>
-          </a:p>
-          <a:p>
-            <a:endParaRPr lang="en-US" baseline="0" dirty="0" smtClean="0"/>
-          </a:p>
-          <a:p>
-            <a:pPr marL="171450" indent="-171450">
-              <a:buFont typeface="Arial" panose="020B0604020202020204" pitchFamily="34" charset="0"/>
-              <a:buChar char="•"/>
-            </a:pPr>
-            <a:r>
-              <a:rPr lang="en-US" baseline="0" dirty="0" smtClean="0"/>
-              <a:t>Smogon is one of the leaders in competitive Pokémon battling. The people at Smogon have created an online battler where people can easily battle each other and save records of their battles. </a:t>
-            </a:r>
-            <a:r>
-              <a:rPr lang="en-US" baseline="0" dirty="0" smtClean="0"/>
-              <a:t>They frequently hold tournaments and are very active contributors to the “meta” of Player VS Player Pokémon.</a:t>
-            </a:r>
-          </a:p>
-          <a:p>
-            <a:pPr marL="628650" lvl="1" indent="-171450">
-              <a:buFont typeface="Arial" panose="020B0604020202020204" pitchFamily="34" charset="0"/>
-              <a:buChar char="•"/>
-            </a:pPr>
-            <a:r>
-              <a:rPr lang="en-US" baseline="0" dirty="0" smtClean="0"/>
-              <a:t>Smogon sets the Pokémon Battle Tiers</a:t>
-            </a:r>
-          </a:p>
-          <a:p>
-            <a:pPr marL="1085850" lvl="2" indent="-171450">
-              <a:buFont typeface="Arial" panose="020B0604020202020204" pitchFamily="34" charset="0"/>
-              <a:buChar char="•"/>
-            </a:pPr>
-            <a:r>
-              <a:rPr lang="en-US" baseline="0" dirty="0" smtClean="0"/>
-              <a:t>Battle tiers are updated every 3 months based off of usage statistics</a:t>
-            </a:r>
-          </a:p>
-          <a:p>
-            <a:pPr marL="1543050" lvl="3" indent="-171450">
-              <a:buFont typeface="Arial" panose="020B0604020202020204" pitchFamily="34" charset="0"/>
-              <a:buChar char="•"/>
-            </a:pPr>
-            <a:r>
-              <a:rPr lang="en-US" baseline="0" dirty="0" smtClean="0"/>
-              <a:t>We used battles form the OU tier, which is the most popular tier</a:t>
-            </a:r>
-          </a:p>
-          <a:p>
-            <a:pPr marL="1085850" lvl="2" indent="-171450">
-              <a:buFont typeface="Arial" panose="020B0604020202020204" pitchFamily="34" charset="0"/>
-              <a:buChar char="•"/>
-            </a:pPr>
-            <a:r>
-              <a:rPr lang="en-US" baseline="0" dirty="0" smtClean="0"/>
-              <a:t>This means that the tiers actively evolve as the meta grows.</a:t>
-            </a:r>
-          </a:p>
-          <a:p>
-            <a:pPr marL="1543050" lvl="3" indent="-171450">
-              <a:buFont typeface="Arial" panose="020B0604020202020204" pitchFamily="34" charset="0"/>
-              <a:buChar char="•"/>
-            </a:pPr>
-            <a:r>
-              <a:rPr lang="en-US" baseline="0" dirty="0" smtClean="0"/>
-              <a:t>Our data spans a time of 1 year (Jan 2014 – April 2015)</a:t>
-            </a:r>
-          </a:p>
-          <a:p>
-            <a:pPr marL="628650" lvl="1" indent="-171450">
-              <a:buFont typeface="Arial" panose="020B0604020202020204" pitchFamily="34" charset="0"/>
-              <a:buChar char="•"/>
-            </a:pPr>
-            <a:r>
-              <a:rPr lang="en-US" baseline="0" dirty="0" smtClean="0"/>
-              <a:t>We took over 300 battles from three different Smogon tournaments and divided parsed the data to find things such as:</a:t>
-            </a:r>
-          </a:p>
-          <a:p>
-            <a:pPr marL="1085850" lvl="2" indent="-171450">
-              <a:buFont typeface="Arial" panose="020B0604020202020204" pitchFamily="34" charset="0"/>
-              <a:buChar char="•"/>
-            </a:pPr>
-            <a:r>
-              <a:rPr lang="en-US" baseline="0" dirty="0" smtClean="0"/>
-              <a:t> moves actually used in battle</a:t>
-            </a:r>
-          </a:p>
-          <a:p>
-            <a:pPr marL="1085850" lvl="2" indent="-171450">
-              <a:buFont typeface="Arial" panose="020B0604020202020204" pitchFamily="34" charset="0"/>
-              <a:buChar char="•"/>
-            </a:pPr>
-            <a:r>
-              <a:rPr lang="en-US" strike="sngStrike" baseline="0" dirty="0" smtClean="0"/>
-              <a:t>Status effects used</a:t>
-            </a:r>
-          </a:p>
-          <a:p>
-            <a:pPr marL="1085850" lvl="2" indent="-171450">
-              <a:buFont typeface="Arial" panose="020B0604020202020204" pitchFamily="34" charset="0"/>
-              <a:buChar char="•"/>
-            </a:pPr>
-            <a:r>
-              <a:rPr lang="en-US" strike="sngStrike" baseline="0" dirty="0" smtClean="0"/>
-              <a:t>Weather changes</a:t>
-            </a:r>
-          </a:p>
-          <a:p>
-            <a:pPr marL="1085850" lvl="2" indent="-171450">
-              <a:buFont typeface="Arial" panose="020B0604020202020204" pitchFamily="34" charset="0"/>
-              <a:buChar char="•"/>
-            </a:pPr>
-            <a:r>
-              <a:rPr lang="en-US" baseline="0" dirty="0" smtClean="0"/>
-              <a:t>Items used</a:t>
-            </a:r>
-          </a:p>
-          <a:p>
-            <a:pPr marL="1085850" lvl="2" indent="-171450">
-              <a:buFont typeface="Arial" panose="020B0604020202020204" pitchFamily="34" charset="0"/>
-              <a:buChar char="•"/>
-            </a:pPr>
-            <a:r>
-              <a:rPr lang="en-US" strike="sngStrike" baseline="0" dirty="0" smtClean="0"/>
-              <a:t>Entry Hazards</a:t>
-            </a:r>
-          </a:p>
-          <a:p>
-            <a:pPr marL="1085850" lvl="2" indent="-171450">
-              <a:buFont typeface="Arial" panose="020B0604020202020204" pitchFamily="34" charset="0"/>
-              <a:buChar char="•"/>
-            </a:pPr>
-            <a:r>
-              <a:rPr lang="en-US" baseline="0" dirty="0" smtClean="0"/>
-              <a:t>Pokémon Transformations used</a:t>
-            </a:r>
-          </a:p>
-          <a:p>
-            <a:pPr marL="628650" lvl="1" indent="-171450">
-              <a:buFont typeface="Arial" panose="020B0604020202020204" pitchFamily="34" charset="0"/>
-              <a:buChar char="•"/>
-            </a:pPr>
-            <a:r>
-              <a:rPr lang="en-US" baseline="0" dirty="0" smtClean="0"/>
-              <a:t>We then divided these sets into our training and test sets for our classifiers. </a:t>
-            </a:r>
-          </a:p>
-          <a:p>
-            <a:pPr marL="1085850" lvl="2" indent="-171450">
-              <a:buFont typeface="Arial" panose="020B0604020202020204" pitchFamily="34" charset="0"/>
-              <a:buChar char="•"/>
-            </a:pPr>
+              <a:t>Kevin should talk about this</a:t>
+            </a:r>
             <a:endParaRPr lang="en-US" dirty="0"/>
           </a:p>
         </p:txBody>
@@ -5182,7 +4972,7 @@
     </p:spTree>
     <p:extLst>
       <p:ext uri="{BB962C8B-B14F-4D97-AF65-F5344CB8AC3E}">
-        <p14:creationId xmlns:p14="http://schemas.microsoft.com/office/powerpoint/2010/main" val="2625267798"/>
+        <p14:creationId xmlns:p14="http://schemas.microsoft.com/office/powerpoint/2010/main" val="1181329945"/>
       </p:ext>
     </p:extLst>
   </p:cSld>
@@ -5238,8 +5028,201 @@
           <a:p>
             <a:r>
               <a:rPr lang="en-US" dirty="0" smtClean="0"/>
-              <a:t>Kevin should talk about this</a:t>
-            </a:r>
+              <a:t>Rob Speak: </a:t>
+            </a:r>
+          </a:p>
+          <a:p>
+            <a:endParaRPr lang="en-US" dirty="0" smtClean="0"/>
+          </a:p>
+          <a:p>
+            <a:r>
+              <a:rPr lang="en-US" dirty="0" smtClean="0"/>
+              <a:t>We</a:t>
+            </a:r>
+            <a:r>
+              <a:rPr lang="en-US" baseline="0" dirty="0" smtClean="0"/>
+              <a:t> obtained our Pokémon data from two sources. Serebii.net and Smogon.com</a:t>
+            </a:r>
+          </a:p>
+          <a:p>
+            <a:endParaRPr lang="en-US" baseline="0" dirty="0" smtClean="0"/>
+          </a:p>
+          <a:p>
+            <a:pPr marL="171450" indent="-171450">
+              <a:buFont typeface="Arial" panose="020B0604020202020204" pitchFamily="34" charset="0"/>
+              <a:buChar char="•"/>
+            </a:pPr>
+            <a:r>
+              <a:rPr lang="en-US" baseline="0" dirty="0" smtClean="0"/>
+              <a:t>Serebii is a very popular source of Pokémon information, containing a massive database of all Pokémon, attacks, abilities and items</a:t>
+            </a:r>
+          </a:p>
+          <a:p>
+            <a:pPr marL="628650" lvl="1" indent="-171450">
+              <a:buFont typeface="Arial" panose="020B0604020202020204" pitchFamily="34" charset="0"/>
+              <a:buChar char="•"/>
+            </a:pPr>
+            <a:r>
+              <a:rPr lang="en-US" baseline="0" dirty="0" smtClean="0"/>
+              <a:t>We were able to scrape through Serebii to gather all the </a:t>
+            </a:r>
+            <a:r>
+              <a:rPr lang="en-US" baseline="0" dirty="0" err="1" smtClean="0"/>
+              <a:t>staticall</a:t>
+            </a:r>
+            <a:r>
+              <a:rPr lang="en-US" baseline="0" dirty="0" smtClean="0"/>
+              <a:t> data that we needed for our battle simulator. </a:t>
+            </a:r>
+          </a:p>
+          <a:p>
+            <a:endParaRPr lang="en-US" baseline="0" dirty="0" smtClean="0"/>
+          </a:p>
+          <a:p>
+            <a:pPr marL="171450" indent="-171450">
+              <a:buFont typeface="Arial" panose="020B0604020202020204" pitchFamily="34" charset="0"/>
+              <a:buChar char="•"/>
+            </a:pPr>
+            <a:r>
+              <a:rPr lang="en-US" baseline="0" dirty="0" smtClean="0"/>
+              <a:t>Smogon is one of the leaders in competitive Pokémon battling. The people at Smogon have created an online battler where people can easily battle each other and save records of their battles. They frequently hold tournaments and are very active contributors to the “meta” of Player VS Player Pokémon.</a:t>
+            </a:r>
+          </a:p>
+          <a:p>
+            <a:pPr marL="628650" lvl="1" indent="-171450">
+              <a:buFont typeface="Arial" panose="020B0604020202020204" pitchFamily="34" charset="0"/>
+              <a:buChar char="•"/>
+            </a:pPr>
+            <a:r>
+              <a:rPr lang="en-US" baseline="0" dirty="0" smtClean="0"/>
+              <a:t>Smogon sets the Pokémon Battle Tiers</a:t>
+            </a:r>
+          </a:p>
+          <a:p>
+            <a:pPr marL="1085850" lvl="2" indent="-171450">
+              <a:buFont typeface="Arial" panose="020B0604020202020204" pitchFamily="34" charset="0"/>
+              <a:buChar char="•"/>
+            </a:pPr>
+            <a:r>
+              <a:rPr lang="en-US" baseline="0" dirty="0" smtClean="0"/>
+              <a:t>Battle tiers are updated every 3 months based off of usage statistics</a:t>
+            </a:r>
+          </a:p>
+          <a:p>
+            <a:pPr marL="1543050" lvl="3" indent="-171450">
+              <a:buFont typeface="Arial" panose="020B0604020202020204" pitchFamily="34" charset="0"/>
+              <a:buChar char="•"/>
+            </a:pPr>
+            <a:r>
+              <a:rPr lang="en-US" baseline="0" dirty="0" smtClean="0"/>
+              <a:t>We used battles form the OU tier, which is the most popular tier</a:t>
+            </a:r>
+          </a:p>
+          <a:p>
+            <a:pPr marL="1085850" lvl="2" indent="-171450">
+              <a:buFont typeface="Arial" panose="020B0604020202020204" pitchFamily="34" charset="0"/>
+              <a:buChar char="•"/>
+            </a:pPr>
+            <a:r>
+              <a:rPr lang="en-US" baseline="0" dirty="0" smtClean="0"/>
+              <a:t>This means that the tiers actively evolve as the meta grows.</a:t>
+            </a:r>
+          </a:p>
+          <a:p>
+            <a:pPr marL="1543050" lvl="3" indent="-171450">
+              <a:buFont typeface="Arial" panose="020B0604020202020204" pitchFamily="34" charset="0"/>
+              <a:buChar char="•"/>
+            </a:pPr>
+            <a:r>
+              <a:rPr lang="en-US" baseline="0" dirty="0" smtClean="0"/>
+              <a:t>Our data spans a time of 1 year (Jan 2014 – April 2015)</a:t>
+            </a:r>
+          </a:p>
+          <a:p>
+            <a:pPr marL="628650" lvl="1" indent="-171450">
+              <a:buFont typeface="Arial" panose="020B0604020202020204" pitchFamily="34" charset="0"/>
+              <a:buChar char="•"/>
+            </a:pPr>
+            <a:r>
+              <a:rPr lang="en-US" baseline="0" dirty="0" smtClean="0"/>
+              <a:t>We took over 300 battles from three different Smogon tournaments and divided parsed the data to find things such as:</a:t>
+            </a:r>
+          </a:p>
+          <a:p>
+            <a:pPr marL="1085850" lvl="2" indent="-171450">
+              <a:buFont typeface="Arial" panose="020B0604020202020204" pitchFamily="34" charset="0"/>
+              <a:buChar char="•"/>
+            </a:pPr>
+            <a:r>
+              <a:rPr lang="en-US" baseline="0" dirty="0" smtClean="0"/>
+              <a:t> moves actually used in battle</a:t>
+            </a:r>
+          </a:p>
+          <a:p>
+            <a:pPr marL="1085850" lvl="2" indent="-171450">
+              <a:buFont typeface="Arial" panose="020B0604020202020204" pitchFamily="34" charset="0"/>
+              <a:buChar char="•"/>
+            </a:pPr>
+            <a:r>
+              <a:rPr lang="en-US" strike="sngStrike" baseline="0" dirty="0" smtClean="0"/>
+              <a:t>Status effects used</a:t>
+            </a:r>
+          </a:p>
+          <a:p>
+            <a:pPr marL="1085850" lvl="2" indent="-171450">
+              <a:buFont typeface="Arial" panose="020B0604020202020204" pitchFamily="34" charset="0"/>
+              <a:buChar char="•"/>
+            </a:pPr>
+            <a:r>
+              <a:rPr lang="en-US" strike="sngStrike" baseline="0" dirty="0" smtClean="0"/>
+              <a:t>Weather changes</a:t>
+            </a:r>
+          </a:p>
+          <a:p>
+            <a:pPr marL="1085850" lvl="2" indent="-171450">
+              <a:buFont typeface="Arial" panose="020B0604020202020204" pitchFamily="34" charset="0"/>
+              <a:buChar char="•"/>
+            </a:pPr>
+            <a:r>
+              <a:rPr lang="en-US" baseline="0" dirty="0" smtClean="0"/>
+              <a:t>Items used</a:t>
+            </a:r>
+          </a:p>
+          <a:p>
+            <a:pPr marL="1085850" lvl="2" indent="-171450">
+              <a:buFont typeface="Arial" panose="020B0604020202020204" pitchFamily="34" charset="0"/>
+              <a:buChar char="•"/>
+            </a:pPr>
+            <a:r>
+              <a:rPr lang="en-US" strike="sngStrike" baseline="0" dirty="0" smtClean="0"/>
+              <a:t>Entry Hazards</a:t>
+            </a:r>
+          </a:p>
+          <a:p>
+            <a:pPr marL="1085850" lvl="2" indent="-171450">
+              <a:buFont typeface="Arial" panose="020B0604020202020204" pitchFamily="34" charset="0"/>
+              <a:buChar char="•"/>
+            </a:pPr>
+            <a:r>
+              <a:rPr lang="en-US" baseline="0" dirty="0" smtClean="0"/>
+              <a:t>Pokémon Transformations used</a:t>
+            </a:r>
+          </a:p>
+          <a:p>
+            <a:pPr marL="628650" lvl="1" indent="-171450">
+              <a:buFont typeface="Arial" panose="020B0604020202020204" pitchFamily="34" charset="0"/>
+              <a:buChar char="•"/>
+            </a:pPr>
+            <a:r>
+              <a:rPr lang="en-US" baseline="0" dirty="0" smtClean="0"/>
+              <a:t>We then divided these sets into our training and test sets for our classifiers. </a:t>
+            </a:r>
+          </a:p>
+          <a:p>
+            <a:pPr marL="1085850" lvl="2" indent="-171450">
+              <a:buFont typeface="Arial" panose="020B0604020202020204" pitchFamily="34" charset="0"/>
+              <a:buChar char="•"/>
+            </a:pPr>
             <a:endParaRPr lang="en-US" dirty="0"/>
           </a:p>
         </p:txBody>
@@ -5270,7 +5253,7 @@
     </p:spTree>
     <p:extLst>
       <p:ext uri="{BB962C8B-B14F-4D97-AF65-F5344CB8AC3E}">
-        <p14:creationId xmlns:p14="http://schemas.microsoft.com/office/powerpoint/2010/main" val="1181329945"/>
+        <p14:creationId xmlns:p14="http://schemas.microsoft.com/office/powerpoint/2010/main" val="2625267798"/>
       </p:ext>
     </p:extLst>
   </p:cSld>
@@ -5424,11 +5407,7 @@
             </a:r>
             <a:r>
               <a:rPr lang="en-US" baseline="0" dirty="0" smtClean="0"/>
-              <a:t> in the Data </a:t>
-            </a:r>
-            <a:r>
-              <a:rPr lang="en-US" baseline="0" dirty="0" smtClean="0"/>
-              <a:t>Set</a:t>
+              <a:t> in the Data Set</a:t>
             </a:r>
           </a:p>
           <a:p>
@@ -9063,24 +9042,219 @@
   <p:clrMapOvr>
     <a:masterClrMapping/>
   </p:clrMapOvr>
-  <mc:AlternateContent xmlns:mc="http://schemas.openxmlformats.org/markup-compatibility/2006" xmlns:p14="http://schemas.microsoft.com/office/powerpoint/2010/main">
-    <mc:Choice Requires="p14">
-      <p:transition spd="med" p14:dur="700">
-        <p:fade/>
+  <mc:AlternateContent xmlns:mc="http://schemas.openxmlformats.org/markup-compatibility/2006">
+    <mc:Choice xmlns:p14="http://schemas.microsoft.com/office/powerpoint/2010/main" Requires="p14">
+      <p:transition spd="slow" p14:dur="2000">
+        <p:pull/>
       </p:transition>
     </mc:Choice>
-    <mc:Fallback xmlns="">
-      <p:transition spd="med">
-        <p:fade/>
+    <mc:Fallback>
+      <p:transition spd="slow">
+        <p:pull/>
       </p:transition>
     </mc:Fallback>
   </mc:AlternateContent>
   <p:timing>
     <p:tnLst>
       <p:par>
-        <p:cTn id="1" dur="indefinite" restart="never" nodeType="tmRoot"/>
+        <p:cTn id="1" dur="indefinite" restart="never" nodeType="tmRoot">
+          <p:childTnLst>
+            <p:seq concurrent="1" nextAc="seek">
+              <p:cTn id="2" dur="indefinite" nodeType="mainSeq">
+                <p:childTnLst>
+                  <p:par>
+                    <p:cTn id="3" fill="hold">
+                      <p:stCondLst>
+                        <p:cond delay="indefinite"/>
+                      </p:stCondLst>
+                      <p:childTnLst>
+                        <p:par>
+                          <p:cTn id="4" fill="hold">
+                            <p:stCondLst>
+                              <p:cond delay="0"/>
+                            </p:stCondLst>
+                            <p:childTnLst>
+                              <p:par>
+                                <p:cTn id="5" presetID="6" presetClass="entr" presetSubtype="16" fill="hold" grpId="0" nodeType="clickEffect">
+                                  <p:stCondLst>
+                                    <p:cond delay="0"/>
+                                  </p:stCondLst>
+                                  <p:childTnLst>
+                                    <p:set>
+                                      <p:cBhvr>
+                                        <p:cTn id="6" dur="1" fill="hold">
+                                          <p:stCondLst>
+                                            <p:cond delay="0"/>
+                                          </p:stCondLst>
+                                        </p:cTn>
+                                        <p:tgtEl>
+                                          <p:spTgt spid="2"/>
+                                        </p:tgtEl>
+                                        <p:attrNameLst>
+                                          <p:attrName>style.visibility</p:attrName>
+                                        </p:attrNameLst>
+                                      </p:cBhvr>
+                                      <p:to>
+                                        <p:strVal val="visible"/>
+                                      </p:to>
+                                    </p:set>
+                                    <p:animEffect transition="in" filter="circle(in)">
+                                      <p:cBhvr>
+                                        <p:cTn id="7" dur="2000"/>
+                                        <p:tgtEl>
+                                          <p:spTgt spid="2"/>
+                                        </p:tgtEl>
+                                      </p:cBhvr>
+                                    </p:animEffect>
+                                  </p:childTnLst>
+                                </p:cTn>
+                              </p:par>
+                            </p:childTnLst>
+                          </p:cTn>
+                        </p:par>
+                      </p:childTnLst>
+                    </p:cTn>
+                  </p:par>
+                  <p:par>
+                    <p:cTn id="8" fill="hold">
+                      <p:stCondLst>
+                        <p:cond delay="indefinite"/>
+                      </p:stCondLst>
+                      <p:childTnLst>
+                        <p:par>
+                          <p:cTn id="9" fill="hold">
+                            <p:stCondLst>
+                              <p:cond delay="0"/>
+                            </p:stCondLst>
+                            <p:childTnLst>
+                              <p:par>
+                                <p:cTn id="10" presetID="10" presetClass="entr" presetSubtype="0" fill="hold" grpId="0" nodeType="clickEffect">
+                                  <p:stCondLst>
+                                    <p:cond delay="0"/>
+                                  </p:stCondLst>
+                                  <p:childTnLst>
+                                    <p:set>
+                                      <p:cBhvr>
+                                        <p:cTn id="11" dur="1" fill="hold">
+                                          <p:stCondLst>
+                                            <p:cond delay="0"/>
+                                          </p:stCondLst>
+                                        </p:cTn>
+                                        <p:tgtEl>
+                                          <p:spTgt spid="3">
+                                            <p:txEl>
+                                              <p:pRg st="0" end="0"/>
+                                            </p:txEl>
+                                          </p:spTgt>
+                                        </p:tgtEl>
+                                        <p:attrNameLst>
+                                          <p:attrName>style.visibility</p:attrName>
+                                        </p:attrNameLst>
+                                      </p:cBhvr>
+                                      <p:to>
+                                        <p:strVal val="visible"/>
+                                      </p:to>
+                                    </p:set>
+                                    <p:animEffect transition="in" filter="fade">
+                                      <p:cBhvr>
+                                        <p:cTn id="12" dur="500"/>
+                                        <p:tgtEl>
+                                          <p:spTgt spid="3">
+                                            <p:txEl>
+                                              <p:pRg st="0" end="0"/>
+                                            </p:txEl>
+                                          </p:spTgt>
+                                        </p:tgtEl>
+                                      </p:cBhvr>
+                                    </p:animEffect>
+                                  </p:childTnLst>
+                                </p:cTn>
+                              </p:par>
+                            </p:childTnLst>
+                          </p:cTn>
+                        </p:par>
+                      </p:childTnLst>
+                    </p:cTn>
+                  </p:par>
+                  <p:par>
+                    <p:cTn id="13" fill="hold">
+                      <p:stCondLst>
+                        <p:cond delay="indefinite"/>
+                      </p:stCondLst>
+                      <p:childTnLst>
+                        <p:par>
+                          <p:cTn id="14" fill="hold">
+                            <p:stCondLst>
+                              <p:cond delay="0"/>
+                            </p:stCondLst>
+                            <p:childTnLst>
+                              <p:par>
+                                <p:cTn id="15" presetID="16" presetClass="entr" presetSubtype="21" fill="hold" grpId="0" nodeType="clickEffect">
+                                  <p:stCondLst>
+                                    <p:cond delay="0"/>
+                                  </p:stCondLst>
+                                  <p:childTnLst>
+                                    <p:set>
+                                      <p:cBhvr>
+                                        <p:cTn id="16" dur="1" fill="hold">
+                                          <p:stCondLst>
+                                            <p:cond delay="0"/>
+                                          </p:stCondLst>
+                                        </p:cTn>
+                                        <p:tgtEl>
+                                          <p:spTgt spid="4"/>
+                                        </p:tgtEl>
+                                        <p:attrNameLst>
+                                          <p:attrName>style.visibility</p:attrName>
+                                        </p:attrNameLst>
+                                      </p:cBhvr>
+                                      <p:to>
+                                        <p:strVal val="visible"/>
+                                      </p:to>
+                                    </p:set>
+                                    <p:animEffect transition="in" filter="barn(inVertical)">
+                                      <p:cBhvr>
+                                        <p:cTn id="17" dur="1250"/>
+                                        <p:tgtEl>
+                                          <p:spTgt spid="4"/>
+                                        </p:tgtEl>
+                                      </p:cBhvr>
+                                    </p:animEffect>
+                                  </p:childTnLst>
+                                </p:cTn>
+                              </p:par>
+                            </p:childTnLst>
+                          </p:cTn>
+                        </p:par>
+                      </p:childTnLst>
+                    </p:cTn>
+                  </p:par>
+                </p:childTnLst>
+              </p:cTn>
+              <p:prevCondLst>
+                <p:cond evt="onPrev" delay="0">
+                  <p:tgtEl>
+                    <p:sldTgt/>
+                  </p:tgtEl>
+                </p:cond>
+              </p:prevCondLst>
+              <p:nextCondLst>
+                <p:cond evt="onNext" delay="0">
+                  <p:tgtEl>
+                    <p:sldTgt/>
+                  </p:tgtEl>
+                </p:cond>
+              </p:nextCondLst>
+            </p:seq>
+          </p:childTnLst>
+        </p:cTn>
       </p:par>
     </p:tnLst>
+    <p:bldLst>
+      <p:bldP spid="3" grpId="0" build="p"/>
+      <p:bldP spid="2" grpId="0"/>
+      <p:bldP spid="4" grpId="0" animBg="1"/>
+    </p:bldLst>
   </p:timing>
 </p:sld>
 </file>
@@ -9133,11 +9307,6 @@
               </a:rPr>
               <a:t>How can we better our chances of winning?</a:t>
             </a:r>
-            <a:endParaRPr lang="en-US" sz="3200" dirty="0" smtClean="0">
-              <a:solidFill>
-                <a:schemeClr val="accent3"/>
-              </a:solidFill>
-            </a:endParaRPr>
           </a:p>
           <a:p>
             <a:pPr marL="0" indent="0">
@@ -9361,24 +9530,357 @@
   <p:clrMapOvr>
     <a:masterClrMapping/>
   </p:clrMapOvr>
-  <mc:AlternateContent xmlns:mc="http://schemas.openxmlformats.org/markup-compatibility/2006" xmlns:p14="http://schemas.microsoft.com/office/powerpoint/2010/main">
-    <mc:Choice Requires="p14">
-      <p:transition spd="med" p14:dur="700">
-        <p:fade/>
+  <mc:AlternateContent xmlns:mc="http://schemas.openxmlformats.org/markup-compatibility/2006">
+    <mc:Choice xmlns:p14="http://schemas.microsoft.com/office/powerpoint/2010/main" Requires="p14">
+      <p:transition spd="slow" p14:dur="800">
+        <p:circle/>
       </p:transition>
     </mc:Choice>
-    <mc:Fallback xmlns="">
-      <p:transition spd="med">
-        <p:fade/>
+    <mc:Fallback>
+      <p:transition spd="slow">
+        <p:circle/>
       </p:transition>
     </mc:Fallback>
   </mc:AlternateContent>
   <p:timing>
     <p:tnLst>
       <p:par>
-        <p:cTn id="1" dur="indefinite" restart="never" nodeType="tmRoot"/>
+        <p:cTn id="1" dur="indefinite" restart="never" nodeType="tmRoot">
+          <p:childTnLst>
+            <p:seq concurrent="1" nextAc="seek">
+              <p:cTn id="2" dur="indefinite" nodeType="mainSeq">
+                <p:childTnLst>
+                  <p:par>
+                    <p:cTn id="3" fill="hold">
+                      <p:stCondLst>
+                        <p:cond delay="indefinite"/>
+                        <p:cond evt="onBegin" delay="0">
+                          <p:tn val="2"/>
+                        </p:cond>
+                      </p:stCondLst>
+                      <p:childTnLst>
+                        <p:par>
+                          <p:cTn id="4" fill="hold">
+                            <p:stCondLst>
+                              <p:cond delay="0"/>
+                            </p:stCondLst>
+                            <p:childTnLst>
+                              <p:par>
+                                <p:cTn id="5" presetID="31" presetClass="entr" presetSubtype="0" fill="hold" grpId="0" nodeType="afterEffect">
+                                  <p:stCondLst>
+                                    <p:cond delay="0"/>
+                                  </p:stCondLst>
+                                  <p:childTnLst>
+                                    <p:set>
+                                      <p:cBhvr>
+                                        <p:cTn id="6" dur="1" fill="hold">
+                                          <p:stCondLst>
+                                            <p:cond delay="0"/>
+                                          </p:stCondLst>
+                                        </p:cTn>
+                                        <p:tgtEl>
+                                          <p:spTgt spid="3">
+                                            <p:txEl>
+                                              <p:pRg st="0" end="0"/>
+                                            </p:txEl>
+                                          </p:spTgt>
+                                        </p:tgtEl>
+                                        <p:attrNameLst>
+                                          <p:attrName>style.visibility</p:attrName>
+                                        </p:attrNameLst>
+                                      </p:cBhvr>
+                                      <p:to>
+                                        <p:strVal val="visible"/>
+                                      </p:to>
+                                    </p:set>
+                                    <p:anim calcmode="lin" valueType="num">
+                                      <p:cBhvr>
+                                        <p:cTn id="7" dur="1000" fill="hold"/>
+                                        <p:tgtEl>
+                                          <p:spTgt spid="3">
+                                            <p:txEl>
+                                              <p:pRg st="0" end="0"/>
+                                            </p:txEl>
+                                          </p:spTgt>
+                                        </p:tgtEl>
+                                        <p:attrNameLst>
+                                          <p:attrName>ppt_w</p:attrName>
+                                        </p:attrNameLst>
+                                      </p:cBhvr>
+                                      <p:tavLst>
+                                        <p:tav tm="0">
+                                          <p:val>
+                                            <p:fltVal val="0"/>
+                                          </p:val>
+                                        </p:tav>
+                                        <p:tav tm="100000">
+                                          <p:val>
+                                            <p:strVal val="#ppt_w"/>
+                                          </p:val>
+                                        </p:tav>
+                                      </p:tavLst>
+                                    </p:anim>
+                                    <p:anim calcmode="lin" valueType="num">
+                                      <p:cBhvr>
+                                        <p:cTn id="8" dur="1000" fill="hold"/>
+                                        <p:tgtEl>
+                                          <p:spTgt spid="3">
+                                            <p:txEl>
+                                              <p:pRg st="0" end="0"/>
+                                            </p:txEl>
+                                          </p:spTgt>
+                                        </p:tgtEl>
+                                        <p:attrNameLst>
+                                          <p:attrName>ppt_h</p:attrName>
+                                        </p:attrNameLst>
+                                      </p:cBhvr>
+                                      <p:tavLst>
+                                        <p:tav tm="0">
+                                          <p:val>
+                                            <p:fltVal val="0"/>
+                                          </p:val>
+                                        </p:tav>
+                                        <p:tav tm="100000">
+                                          <p:val>
+                                            <p:strVal val="#ppt_h"/>
+                                          </p:val>
+                                        </p:tav>
+                                      </p:tavLst>
+                                    </p:anim>
+                                    <p:anim calcmode="lin" valueType="num">
+                                      <p:cBhvr>
+                                        <p:cTn id="9" dur="1000" fill="hold"/>
+                                        <p:tgtEl>
+                                          <p:spTgt spid="3">
+                                            <p:txEl>
+                                              <p:pRg st="0" end="0"/>
+                                            </p:txEl>
+                                          </p:spTgt>
+                                        </p:tgtEl>
+                                        <p:attrNameLst>
+                                          <p:attrName>style.rotation</p:attrName>
+                                        </p:attrNameLst>
+                                      </p:cBhvr>
+                                      <p:tavLst>
+                                        <p:tav tm="0">
+                                          <p:val>
+                                            <p:fltVal val="90"/>
+                                          </p:val>
+                                        </p:tav>
+                                        <p:tav tm="100000">
+                                          <p:val>
+                                            <p:fltVal val="0"/>
+                                          </p:val>
+                                        </p:tav>
+                                      </p:tavLst>
+                                    </p:anim>
+                                    <p:animEffect transition="in" filter="fade">
+                                      <p:cBhvr>
+                                        <p:cTn id="10" dur="1000"/>
+                                        <p:tgtEl>
+                                          <p:spTgt spid="3">
+                                            <p:txEl>
+                                              <p:pRg st="0" end="0"/>
+                                            </p:txEl>
+                                          </p:spTgt>
+                                        </p:tgtEl>
+                                      </p:cBhvr>
+                                    </p:animEffect>
+                                  </p:childTnLst>
+                                </p:cTn>
+                              </p:par>
+                            </p:childTnLst>
+                          </p:cTn>
+                        </p:par>
+                      </p:childTnLst>
+                    </p:cTn>
+                  </p:par>
+                  <p:par>
+                    <p:cTn id="11" fill="hold">
+                      <p:stCondLst>
+                        <p:cond delay="indefinite"/>
+                      </p:stCondLst>
+                      <p:childTnLst>
+                        <p:par>
+                          <p:cTn id="12" fill="hold">
+                            <p:stCondLst>
+                              <p:cond delay="0"/>
+                            </p:stCondLst>
+                            <p:childTnLst>
+                              <p:par>
+                                <p:cTn id="13" presetID="10" presetClass="entr" presetSubtype="0" fill="hold" grpId="0" nodeType="clickEffect">
+                                  <p:stCondLst>
+                                    <p:cond delay="0"/>
+                                  </p:stCondLst>
+                                  <p:childTnLst>
+                                    <p:set>
+                                      <p:cBhvr>
+                                        <p:cTn id="14" dur="1" fill="hold">
+                                          <p:stCondLst>
+                                            <p:cond delay="0"/>
+                                          </p:stCondLst>
+                                        </p:cTn>
+                                        <p:tgtEl>
+                                          <p:spTgt spid="4">
+                                            <p:txEl>
+                                              <p:pRg st="0" end="0"/>
+                                            </p:txEl>
+                                          </p:spTgt>
+                                        </p:tgtEl>
+                                        <p:attrNameLst>
+                                          <p:attrName>style.visibility</p:attrName>
+                                        </p:attrNameLst>
+                                      </p:cBhvr>
+                                      <p:to>
+                                        <p:strVal val="visible"/>
+                                      </p:to>
+                                    </p:set>
+                                    <p:animEffect transition="in" filter="fade">
+                                      <p:cBhvr>
+                                        <p:cTn id="15" dur="500"/>
+                                        <p:tgtEl>
+                                          <p:spTgt spid="4">
+                                            <p:txEl>
+                                              <p:pRg st="0" end="0"/>
+                                            </p:txEl>
+                                          </p:spTgt>
+                                        </p:tgtEl>
+                                      </p:cBhvr>
+                                    </p:animEffect>
+                                  </p:childTnLst>
+                                </p:cTn>
+                              </p:par>
+                            </p:childTnLst>
+                          </p:cTn>
+                        </p:par>
+                      </p:childTnLst>
+                    </p:cTn>
+                  </p:par>
+                  <p:par>
+                    <p:cTn id="16" fill="hold">
+                      <p:stCondLst>
+                        <p:cond delay="indefinite"/>
+                      </p:stCondLst>
+                      <p:childTnLst>
+                        <p:par>
+                          <p:cTn id="17" fill="hold">
+                            <p:stCondLst>
+                              <p:cond delay="0"/>
+                            </p:stCondLst>
+                            <p:childTnLst>
+                              <p:par>
+                                <p:cTn id="18" presetID="55" presetClass="entr" presetSubtype="0" fill="hold" grpId="0" nodeType="clickEffect">
+                                  <p:stCondLst>
+                                    <p:cond delay="0"/>
+                                  </p:stCondLst>
+                                  <p:childTnLst>
+                                    <p:set>
+                                      <p:cBhvr>
+                                        <p:cTn id="19" dur="1" fill="hold">
+                                          <p:stCondLst>
+                                            <p:cond delay="0"/>
+                                          </p:stCondLst>
+                                        </p:cTn>
+                                        <p:tgtEl>
+                                          <p:spTgt spid="8"/>
+                                        </p:tgtEl>
+                                        <p:attrNameLst>
+                                          <p:attrName>style.visibility</p:attrName>
+                                        </p:attrNameLst>
+                                      </p:cBhvr>
+                                      <p:to>
+                                        <p:strVal val="visible"/>
+                                      </p:to>
+                                    </p:set>
+                                    <p:anim calcmode="lin" valueType="num">
+                                      <p:cBhvr>
+                                        <p:cTn id="20" dur="1000" fill="hold"/>
+                                        <p:tgtEl>
+                                          <p:spTgt spid="8"/>
+                                        </p:tgtEl>
+                                        <p:attrNameLst>
+                                          <p:attrName>ppt_w</p:attrName>
+                                        </p:attrNameLst>
+                                      </p:cBhvr>
+                                      <p:tavLst>
+                                        <p:tav tm="0">
+                                          <p:val>
+                                            <p:strVal val="#ppt_w*0.70"/>
+                                          </p:val>
+                                        </p:tav>
+                                        <p:tav tm="100000">
+                                          <p:val>
+                                            <p:strVal val="#ppt_w"/>
+                                          </p:val>
+                                        </p:tav>
+                                      </p:tavLst>
+                                    </p:anim>
+                                    <p:anim calcmode="lin" valueType="num">
+                                      <p:cBhvr>
+                                        <p:cTn id="21" dur="1000" fill="hold"/>
+                                        <p:tgtEl>
+                                          <p:spTgt spid="8"/>
+                                        </p:tgtEl>
+                                        <p:attrNameLst>
+                                          <p:attrName>ppt_h</p:attrName>
+                                        </p:attrNameLst>
+                                      </p:cBhvr>
+                                      <p:tavLst>
+                                        <p:tav tm="0">
+                                          <p:val>
+                                            <p:strVal val="#ppt_h"/>
+                                          </p:val>
+                                        </p:tav>
+                                        <p:tav tm="100000">
+                                          <p:val>
+                                            <p:strVal val="#ppt_h"/>
+                                          </p:val>
+                                        </p:tav>
+                                      </p:tavLst>
+                                    </p:anim>
+                                    <p:animEffect transition="in" filter="fade">
+                                      <p:cBhvr>
+                                        <p:cTn id="22" dur="1000"/>
+                                        <p:tgtEl>
+                                          <p:spTgt spid="8"/>
+                                        </p:tgtEl>
+                                      </p:cBhvr>
+                                    </p:animEffect>
+                                  </p:childTnLst>
+                                </p:cTn>
+                              </p:par>
+                            </p:childTnLst>
+                          </p:cTn>
+                        </p:par>
+                      </p:childTnLst>
+                    </p:cTn>
+                  </p:par>
+                </p:childTnLst>
+              </p:cTn>
+              <p:prevCondLst>
+                <p:cond evt="onPrev" delay="0">
+                  <p:tgtEl>
+                    <p:sldTgt/>
+                  </p:tgtEl>
+                </p:cond>
+              </p:prevCondLst>
+              <p:nextCondLst>
+                <p:cond evt="onNext" delay="0">
+                  <p:tgtEl>
+                    <p:sldTgt/>
+                  </p:tgtEl>
+                </p:cond>
+              </p:nextCondLst>
+            </p:seq>
+          </p:childTnLst>
+        </p:cTn>
       </p:par>
     </p:tnLst>
+    <p:bldLst>
+      <p:bldP spid="4" grpId="0" build="p"/>
+      <p:bldP spid="3" grpId="0" build="p"/>
+      <p:bldP spid="8" grpId="0" animBg="1"/>
+    </p:bldLst>
   </p:timing>
 </p:sld>
 </file>
@@ -9402,85 +9904,7 @@
       </p:grpSpPr>
       <p:sp>
         <p:nvSpPr>
-          <p:cNvPr id="8" name="Content Placeholder 7"/>
-          <p:cNvSpPr>
-            <a:spLocks noGrp="1"/>
-          </p:cNvSpPr>
-          <p:nvPr>
-            <p:ph sz="quarter" idx="4"/>
-          </p:nvPr>
-        </p:nvSpPr>
-        <p:spPr/>
-        <p:txBody>
-          <a:bodyPr/>
-          <a:lstStyle/>
-          <a:p>
-            <a:r>
-              <a:rPr lang="en-US" sz="3200" dirty="0" smtClean="0">
-                <a:solidFill>
-                  <a:schemeClr val="accent3"/>
-                </a:solidFill>
-              </a:rPr>
-              <a:t>Battles Records</a:t>
-            </a:r>
-          </a:p>
-          <a:p>
-            <a:pPr marL="0" indent="0">
-              <a:buNone/>
-            </a:pPr>
-            <a:endParaRPr lang="en-US" sz="3200" dirty="0">
-              <a:solidFill>
-                <a:schemeClr val="accent3"/>
-              </a:solidFill>
-            </a:endParaRPr>
-          </a:p>
-          <a:p>
-            <a:r>
-              <a:rPr lang="en-US" sz="3200" dirty="0" smtClean="0">
-                <a:solidFill>
-                  <a:schemeClr val="accent3"/>
-                </a:solidFill>
-              </a:rPr>
-              <a:t>Battle Tiers</a:t>
-            </a:r>
-          </a:p>
-          <a:p>
-            <a:endParaRPr lang="en-US" dirty="0"/>
-          </a:p>
-          <a:p>
-            <a:endParaRPr lang="en-US" dirty="0"/>
-          </a:p>
-        </p:txBody>
-      </p:sp>
-      <p:sp>
-        <p:nvSpPr>
-          <p:cNvPr id="7" name="Text Placeholder 6"/>
-          <p:cNvSpPr>
-            <a:spLocks noGrp="1"/>
-          </p:cNvSpPr>
-          <p:nvPr>
-            <p:ph type="body" sz="quarter" idx="3"/>
-          </p:nvPr>
-        </p:nvSpPr>
-        <p:spPr/>
-        <p:txBody>
-          <a:bodyPr>
-            <a:normAutofit/>
-          </a:bodyPr>
-          <a:lstStyle/>
-          <a:p>
-            <a:pPr algn="ctr"/>
-            <a:r>
-              <a:rPr lang="en-US" sz="3600" dirty="0" smtClean="0"/>
-              <a:t>Smogon.com</a:t>
-            </a:r>
-            <a:endParaRPr lang="en-US" sz="3600" dirty="0"/>
-          </a:p>
-        </p:txBody>
-      </p:sp>
-      <p:sp>
-        <p:nvSpPr>
-          <p:cNvPr id="6" name="Content Placeholder 5"/>
+          <p:cNvPr id="2" name="Content Placeholder 1"/>
           <p:cNvSpPr>
             <a:spLocks noGrp="1"/>
           </p:cNvSpPr>
@@ -9491,20 +9915,26 @@
         <p:spPr/>
         <p:txBody>
           <a:bodyPr>
-            <a:noAutofit/>
+            <a:normAutofit/>
           </a:bodyPr>
           <a:lstStyle/>
           <a:p>
+            <a:pPr marL="0" indent="0">
+              <a:buNone/>
+            </a:pPr>
             <a:r>
               <a:rPr lang="en-US" sz="3200" dirty="0" smtClean="0">
                 <a:solidFill>
                   <a:schemeClr val="accent3"/>
                 </a:solidFill>
               </a:rPr>
-              <a:t>Pokémon</a:t>
-            </a:r>
-          </a:p>
-          <a:p>
+              <a:t>Naïve Bayes</a:t>
+            </a:r>
+          </a:p>
+          <a:p>
+            <a:pPr marL="0" indent="0">
+              <a:buNone/>
+            </a:pPr>
             <a:endParaRPr lang="en-US" sz="3200" dirty="0">
               <a:solidFill>
                 <a:schemeClr val="accent3"/>
@@ -9518,41 +9948,24 @@
                   <a:schemeClr val="accent3"/>
                 </a:solidFill>
               </a:rPr>
-              <a:t>Attacks</a:t>
-            </a:r>
-          </a:p>
-          <a:p>
+              <a:t>Grouped teams by Bayesian predictors</a:t>
+            </a:r>
             <a:endParaRPr lang="en-US" sz="3200" dirty="0">
               <a:solidFill>
                 <a:schemeClr val="accent3"/>
               </a:solidFill>
             </a:endParaRPr>
           </a:p>
-          <a:p>
-            <a:r>
-              <a:rPr lang="en-US" sz="3200" dirty="0" smtClean="0">
-                <a:solidFill>
-                  <a:schemeClr val="accent3"/>
-                </a:solidFill>
-              </a:rPr>
-              <a:t>Items</a:t>
-            </a:r>
-            <a:endParaRPr lang="en-US" sz="3200" dirty="0">
-              <a:solidFill>
-                <a:schemeClr val="accent3"/>
-              </a:solidFill>
-            </a:endParaRPr>
-          </a:p>
         </p:txBody>
       </p:sp>
       <p:sp>
         <p:nvSpPr>
-          <p:cNvPr id="5" name="Text Placeholder 4"/>
+          <p:cNvPr id="16" name="Content Placeholder 15"/>
           <p:cNvSpPr>
             <a:spLocks noGrp="1"/>
           </p:cNvSpPr>
           <p:nvPr>
-            <p:ph type="body" idx="1"/>
+            <p:ph sz="half" idx="1"/>
           </p:nvPr>
         </p:nvSpPr>
         <p:spPr/>
@@ -9562,18 +9975,40 @@
           </a:bodyPr>
           <a:lstStyle/>
           <a:p>
-            <a:pPr algn="ctr"/>
-            <a:r>
-              <a:rPr lang="en-US" sz="3600" dirty="0" smtClean="0"/>
-              <a:t>Serebii.net</a:t>
-            </a:r>
-            <a:endParaRPr lang="en-US" sz="3600" dirty="0"/>
+            <a:pPr marL="0" indent="0">
+              <a:buNone/>
+            </a:pPr>
+            <a:r>
+              <a:rPr lang="en-US" sz="3200" dirty="0" smtClean="0">
+                <a:solidFill>
+                  <a:schemeClr val="accent3"/>
+                </a:solidFill>
+              </a:rPr>
+              <a:t>Spectral Clustering</a:t>
+            </a:r>
+          </a:p>
+          <a:p>
+            <a:endParaRPr lang="en-US" sz="3200" dirty="0">
+              <a:solidFill>
+                <a:schemeClr val="accent3"/>
+              </a:solidFill>
+            </a:endParaRPr>
+          </a:p>
+          <a:p>
+            <a:r>
+              <a:rPr lang="en-US" sz="3200" dirty="0" smtClean="0">
+                <a:solidFill>
+                  <a:schemeClr val="accent3"/>
+                </a:solidFill>
+              </a:rPr>
+              <a:t>Grouped teams that won based on distance measures</a:t>
+            </a:r>
           </a:p>
         </p:txBody>
       </p:sp>
       <p:sp>
         <p:nvSpPr>
-          <p:cNvPr id="2" name="Title 1"/>
+          <p:cNvPr id="15" name="Title 14"/>
           <p:cNvSpPr>
             <a:spLocks noGrp="1"/>
           </p:cNvSpPr>
@@ -9589,7 +10024,7 @@
             <a:pPr algn="ctr"/>
             <a:r>
               <a:rPr lang="en-US" dirty="0" smtClean="0"/>
-              <a:t>Two Main Databases</a:t>
+              <a:t>How we Did It</a:t>
             </a:r>
             <a:endParaRPr lang="en-US" dirty="0"/>
           </a:p>
@@ -9598,7 +10033,7 @@
     </p:spTree>
     <p:extLst>
       <p:ext uri="{BB962C8B-B14F-4D97-AF65-F5344CB8AC3E}">
-        <p14:creationId xmlns:p14="http://schemas.microsoft.com/office/powerpoint/2010/main" val="1375391719"/>
+        <p14:creationId xmlns:p14="http://schemas.microsoft.com/office/powerpoint/2010/main" val="3121873087"/>
       </p:ext>
     </p:extLst>
   </p:cSld>
@@ -9646,7 +10081,85 @@
       </p:grpSpPr>
       <p:sp>
         <p:nvSpPr>
-          <p:cNvPr id="2" name="Content Placeholder 1"/>
+          <p:cNvPr id="8" name="Content Placeholder 7"/>
+          <p:cNvSpPr>
+            <a:spLocks noGrp="1"/>
+          </p:cNvSpPr>
+          <p:nvPr>
+            <p:ph sz="quarter" idx="4"/>
+          </p:nvPr>
+        </p:nvSpPr>
+        <p:spPr/>
+        <p:txBody>
+          <a:bodyPr/>
+          <a:lstStyle/>
+          <a:p>
+            <a:r>
+              <a:rPr lang="en-US" sz="3200" dirty="0" smtClean="0">
+                <a:solidFill>
+                  <a:schemeClr val="accent3"/>
+                </a:solidFill>
+              </a:rPr>
+              <a:t>Battles Records</a:t>
+            </a:r>
+          </a:p>
+          <a:p>
+            <a:pPr marL="0" indent="0">
+              <a:buNone/>
+            </a:pPr>
+            <a:endParaRPr lang="en-US" sz="3200" dirty="0">
+              <a:solidFill>
+                <a:schemeClr val="accent3"/>
+              </a:solidFill>
+            </a:endParaRPr>
+          </a:p>
+          <a:p>
+            <a:r>
+              <a:rPr lang="en-US" sz="3200" dirty="0" smtClean="0">
+                <a:solidFill>
+                  <a:schemeClr val="accent3"/>
+                </a:solidFill>
+              </a:rPr>
+              <a:t>Battle Tiers</a:t>
+            </a:r>
+          </a:p>
+          <a:p>
+            <a:endParaRPr lang="en-US" dirty="0"/>
+          </a:p>
+          <a:p>
+            <a:endParaRPr lang="en-US" dirty="0"/>
+          </a:p>
+        </p:txBody>
+      </p:sp>
+      <p:sp>
+        <p:nvSpPr>
+          <p:cNvPr id="7" name="Text Placeholder 6"/>
+          <p:cNvSpPr>
+            <a:spLocks noGrp="1"/>
+          </p:cNvSpPr>
+          <p:nvPr>
+            <p:ph type="body" sz="quarter" idx="3"/>
+          </p:nvPr>
+        </p:nvSpPr>
+        <p:spPr/>
+        <p:txBody>
+          <a:bodyPr>
+            <a:normAutofit/>
+          </a:bodyPr>
+          <a:lstStyle/>
+          <a:p>
+            <a:pPr algn="ctr"/>
+            <a:r>
+              <a:rPr lang="en-US" sz="3600" dirty="0" smtClean="0"/>
+              <a:t>Smogon.com</a:t>
+            </a:r>
+            <a:endParaRPr lang="en-US" sz="3600" dirty="0"/>
+          </a:p>
+        </p:txBody>
+      </p:sp>
+      <p:sp>
+        <p:nvSpPr>
+          <p:cNvPr id="6" name="Content Placeholder 5"/>
           <p:cNvSpPr>
             <a:spLocks noGrp="1"/>
           </p:cNvSpPr>
@@ -9657,26 +10170,20 @@
         <p:spPr/>
         <p:txBody>
           <a:bodyPr>
-            <a:normAutofit/>
+            <a:noAutofit/>
           </a:bodyPr>
           <a:lstStyle/>
           <a:p>
-            <a:pPr marL="0" indent="0">
-              <a:buNone/>
-            </a:pPr>
             <a:r>
               <a:rPr lang="en-US" sz="3200" dirty="0" smtClean="0">
                 <a:solidFill>
                   <a:schemeClr val="accent3"/>
                 </a:solidFill>
               </a:rPr>
-              <a:t>Naïve Bayes</a:t>
-            </a:r>
-          </a:p>
-          <a:p>
-            <a:pPr marL="0" indent="0">
-              <a:buNone/>
-            </a:pPr>
+              <a:t>Pokémon</a:t>
+            </a:r>
+          </a:p>
+          <a:p>
             <a:endParaRPr lang="en-US" sz="3200" dirty="0">
               <a:solidFill>
                 <a:schemeClr val="accent3"/>
@@ -9690,24 +10197,41 @@
                   <a:schemeClr val="accent3"/>
                 </a:solidFill>
               </a:rPr>
-              <a:t>Grouped teams by Bayesian predictors</a:t>
-            </a:r>
+              <a:t>Attacks</a:t>
+            </a:r>
+          </a:p>
+          <a:p>
             <a:endParaRPr lang="en-US" sz="3200" dirty="0">
               <a:solidFill>
                 <a:schemeClr val="accent3"/>
               </a:solidFill>
             </a:endParaRPr>
           </a:p>
+          <a:p>
+            <a:r>
+              <a:rPr lang="en-US" sz="3200" dirty="0" smtClean="0">
+                <a:solidFill>
+                  <a:schemeClr val="accent3"/>
+                </a:solidFill>
+              </a:rPr>
+              <a:t>Items</a:t>
+            </a:r>
+            <a:endParaRPr lang="en-US" sz="3200" dirty="0">
+              <a:solidFill>
+                <a:schemeClr val="accent3"/>
+              </a:solidFill>
+            </a:endParaRPr>
+          </a:p>
         </p:txBody>
       </p:sp>
       <p:sp>
         <p:nvSpPr>
-          <p:cNvPr id="16" name="Content Placeholder 15"/>
+          <p:cNvPr id="5" name="Text Placeholder 4"/>
           <p:cNvSpPr>
             <a:spLocks noGrp="1"/>
           </p:cNvSpPr>
           <p:nvPr>
-            <p:ph sz="half" idx="1"/>
+            <p:ph type="body" idx="1"/>
           </p:nvPr>
         </p:nvSpPr>
         <p:spPr/>
@@ -9717,45 +10241,18 @@
           </a:bodyPr>
           <a:lstStyle/>
           <a:p>
-            <a:pPr marL="0" indent="0">
-              <a:buNone/>
-            </a:pPr>
-            <a:r>
-              <a:rPr lang="en-US" sz="3200" dirty="0" smtClean="0">
-                <a:solidFill>
-                  <a:schemeClr val="accent3"/>
-                </a:solidFill>
-              </a:rPr>
-              <a:t>Spectral Clustering</a:t>
-            </a:r>
-          </a:p>
-          <a:p>
-            <a:endParaRPr lang="en-US" sz="3200" dirty="0">
-              <a:solidFill>
-                <a:schemeClr val="accent3"/>
-              </a:solidFill>
-            </a:endParaRPr>
-          </a:p>
-          <a:p>
-            <a:r>
-              <a:rPr lang="en-US" sz="3200" dirty="0" smtClean="0">
-                <a:solidFill>
-                  <a:schemeClr val="accent3"/>
-                </a:solidFill>
-              </a:rPr>
-              <a:t>Grouped teams that won based on distance measures</a:t>
-            </a:r>
-            <a:endParaRPr lang="en-US" sz="3200" dirty="0" smtClean="0">
-              <a:solidFill>
-                <a:schemeClr val="accent3"/>
-              </a:solidFill>
-            </a:endParaRPr>
+            <a:pPr algn="ctr"/>
+            <a:r>
+              <a:rPr lang="en-US" sz="3600" dirty="0" smtClean="0"/>
+              <a:t>Serebii.net</a:t>
+            </a:r>
+            <a:endParaRPr lang="en-US" sz="3600" dirty="0"/>
           </a:p>
         </p:txBody>
       </p:sp>
       <p:sp>
         <p:nvSpPr>
-          <p:cNvPr id="15" name="Title 14"/>
+          <p:cNvPr id="2" name="Title 1"/>
           <p:cNvSpPr>
             <a:spLocks noGrp="1"/>
           </p:cNvSpPr>
@@ -9771,11 +10268,7 @@
             <a:pPr algn="ctr"/>
             <a:r>
               <a:rPr lang="en-US" dirty="0" smtClean="0"/>
-              <a:t>How we Did </a:t>
-            </a:r>
-            <a:r>
-              <a:rPr lang="en-US" dirty="0" smtClean="0"/>
-              <a:t>It</a:t>
+              <a:t>Two Main Databases</a:t>
             </a:r>
             <a:endParaRPr lang="en-US" dirty="0"/>
           </a:p>
@@ -9784,7 +10277,7 @@
     </p:spTree>
     <p:extLst>
       <p:ext uri="{BB962C8B-B14F-4D97-AF65-F5344CB8AC3E}">
-        <p14:creationId xmlns:p14="http://schemas.microsoft.com/office/powerpoint/2010/main" val="3121873087"/>
+        <p14:creationId xmlns:p14="http://schemas.microsoft.com/office/powerpoint/2010/main" val="1375391719"/>
       </p:ext>
     </p:extLst>
   </p:cSld>
@@ -9806,9 +10299,573 @@
   <p:timing>
     <p:tnLst>
       <p:par>
-        <p:cTn id="1" dur="indefinite" restart="never" nodeType="tmRoot"/>
+        <p:cTn id="1" dur="indefinite" restart="never" nodeType="tmRoot">
+          <p:childTnLst>
+            <p:seq concurrent="1" nextAc="seek">
+              <p:cTn id="2" dur="indefinite" nodeType="mainSeq">
+                <p:childTnLst>
+                  <p:par>
+                    <p:cTn id="3" fill="hold">
+                      <p:stCondLst>
+                        <p:cond delay="indefinite"/>
+                      </p:stCondLst>
+                      <p:childTnLst>
+                        <p:par>
+                          <p:cTn id="4" fill="hold">
+                            <p:stCondLst>
+                              <p:cond delay="0"/>
+                            </p:stCondLst>
+                            <p:childTnLst>
+                              <p:par>
+                                <p:cTn id="5" presetID="42" presetClass="entr" presetSubtype="0" fill="hold" grpId="0" nodeType="clickEffect">
+                                  <p:stCondLst>
+                                    <p:cond delay="0"/>
+                                  </p:stCondLst>
+                                  <p:childTnLst>
+                                    <p:set>
+                                      <p:cBhvr>
+                                        <p:cTn id="6" dur="1" fill="hold">
+                                          <p:stCondLst>
+                                            <p:cond delay="0"/>
+                                          </p:stCondLst>
+                                        </p:cTn>
+                                        <p:tgtEl>
+                                          <p:spTgt spid="5">
+                                            <p:txEl>
+                                              <p:pRg st="0" end="0"/>
+                                            </p:txEl>
+                                          </p:spTgt>
+                                        </p:tgtEl>
+                                        <p:attrNameLst>
+                                          <p:attrName>style.visibility</p:attrName>
+                                        </p:attrNameLst>
+                                      </p:cBhvr>
+                                      <p:to>
+                                        <p:strVal val="visible"/>
+                                      </p:to>
+                                    </p:set>
+                                    <p:animEffect transition="in" filter="fade">
+                                      <p:cBhvr>
+                                        <p:cTn id="7" dur="1000"/>
+                                        <p:tgtEl>
+                                          <p:spTgt spid="5">
+                                            <p:txEl>
+                                              <p:pRg st="0" end="0"/>
+                                            </p:txEl>
+                                          </p:spTgt>
+                                        </p:tgtEl>
+                                      </p:cBhvr>
+                                    </p:animEffect>
+                                    <p:anim calcmode="lin" valueType="num">
+                                      <p:cBhvr>
+                                        <p:cTn id="8" dur="1000" fill="hold"/>
+                                        <p:tgtEl>
+                                          <p:spTgt spid="5">
+                                            <p:txEl>
+                                              <p:pRg st="0" end="0"/>
+                                            </p:txEl>
+                                          </p:spTgt>
+                                        </p:tgtEl>
+                                        <p:attrNameLst>
+                                          <p:attrName>ppt_x</p:attrName>
+                                        </p:attrNameLst>
+                                      </p:cBhvr>
+                                      <p:tavLst>
+                                        <p:tav tm="0">
+                                          <p:val>
+                                            <p:strVal val="#ppt_x"/>
+                                          </p:val>
+                                        </p:tav>
+                                        <p:tav tm="100000">
+                                          <p:val>
+                                            <p:strVal val="#ppt_x"/>
+                                          </p:val>
+                                        </p:tav>
+                                      </p:tavLst>
+                                    </p:anim>
+                                    <p:anim calcmode="lin" valueType="num">
+                                      <p:cBhvr>
+                                        <p:cTn id="9" dur="1000" fill="hold"/>
+                                        <p:tgtEl>
+                                          <p:spTgt spid="5">
+                                            <p:txEl>
+                                              <p:pRg st="0" end="0"/>
+                                            </p:txEl>
+                                          </p:spTgt>
+                                        </p:tgtEl>
+                                        <p:attrNameLst>
+                                          <p:attrName>ppt_y</p:attrName>
+                                        </p:attrNameLst>
+                                      </p:cBhvr>
+                                      <p:tavLst>
+                                        <p:tav tm="0">
+                                          <p:val>
+                                            <p:strVal val="#ppt_y+.1"/>
+                                          </p:val>
+                                        </p:tav>
+                                        <p:tav tm="100000">
+                                          <p:val>
+                                            <p:strVal val="#ppt_y"/>
+                                          </p:val>
+                                        </p:tav>
+                                      </p:tavLst>
+                                    </p:anim>
+                                  </p:childTnLst>
+                                </p:cTn>
+                              </p:par>
+                            </p:childTnLst>
+                          </p:cTn>
+                        </p:par>
+                      </p:childTnLst>
+                    </p:cTn>
+                  </p:par>
+                  <p:par>
+                    <p:cTn id="10" fill="hold">
+                      <p:stCondLst>
+                        <p:cond delay="indefinite"/>
+                      </p:stCondLst>
+                      <p:childTnLst>
+                        <p:par>
+                          <p:cTn id="11" fill="hold">
+                            <p:stCondLst>
+                              <p:cond delay="0"/>
+                            </p:stCondLst>
+                            <p:childTnLst>
+                              <p:par>
+                                <p:cTn id="12" presetID="13" presetClass="entr" presetSubtype="16" fill="hold" grpId="0" nodeType="clickEffect">
+                                  <p:stCondLst>
+                                    <p:cond delay="0"/>
+                                  </p:stCondLst>
+                                  <p:childTnLst>
+                                    <p:set>
+                                      <p:cBhvr>
+                                        <p:cTn id="13" dur="1" fill="hold">
+                                          <p:stCondLst>
+                                            <p:cond delay="0"/>
+                                          </p:stCondLst>
+                                        </p:cTn>
+                                        <p:tgtEl>
+                                          <p:spTgt spid="6">
+                                            <p:txEl>
+                                              <p:pRg st="0" end="0"/>
+                                            </p:txEl>
+                                          </p:spTgt>
+                                        </p:tgtEl>
+                                        <p:attrNameLst>
+                                          <p:attrName>style.visibility</p:attrName>
+                                        </p:attrNameLst>
+                                      </p:cBhvr>
+                                      <p:to>
+                                        <p:strVal val="visible"/>
+                                      </p:to>
+                                    </p:set>
+                                    <p:animEffect transition="in" filter="plus(in)">
+                                      <p:cBhvr>
+                                        <p:cTn id="14" dur="2000"/>
+                                        <p:tgtEl>
+                                          <p:spTgt spid="6">
+                                            <p:txEl>
+                                              <p:pRg st="0" end="0"/>
+                                            </p:txEl>
+                                          </p:spTgt>
+                                        </p:tgtEl>
+                                      </p:cBhvr>
+                                    </p:animEffect>
+                                  </p:childTnLst>
+                                </p:cTn>
+                              </p:par>
+                            </p:childTnLst>
+                          </p:cTn>
+                        </p:par>
+                      </p:childTnLst>
+                    </p:cTn>
+                  </p:par>
+                  <p:par>
+                    <p:cTn id="15" fill="hold">
+                      <p:stCondLst>
+                        <p:cond delay="indefinite"/>
+                      </p:stCondLst>
+                      <p:childTnLst>
+                        <p:par>
+                          <p:cTn id="16" fill="hold">
+                            <p:stCondLst>
+                              <p:cond delay="0"/>
+                            </p:stCondLst>
+                            <p:childTnLst>
+                              <p:par>
+                                <p:cTn id="17" presetID="13" presetClass="entr" presetSubtype="16" fill="hold" grpId="0" nodeType="clickEffect">
+                                  <p:stCondLst>
+                                    <p:cond delay="0"/>
+                                  </p:stCondLst>
+                                  <p:childTnLst>
+                                    <p:set>
+                                      <p:cBhvr>
+                                        <p:cTn id="18" dur="1" fill="hold">
+                                          <p:stCondLst>
+                                            <p:cond delay="0"/>
+                                          </p:stCondLst>
+                                        </p:cTn>
+                                        <p:tgtEl>
+                                          <p:spTgt spid="6">
+                                            <p:txEl>
+                                              <p:pRg st="2" end="2"/>
+                                            </p:txEl>
+                                          </p:spTgt>
+                                        </p:tgtEl>
+                                        <p:attrNameLst>
+                                          <p:attrName>style.visibility</p:attrName>
+                                        </p:attrNameLst>
+                                      </p:cBhvr>
+                                      <p:to>
+                                        <p:strVal val="visible"/>
+                                      </p:to>
+                                    </p:set>
+                                    <p:animEffect transition="in" filter="plus(in)">
+                                      <p:cBhvr>
+                                        <p:cTn id="19" dur="2000"/>
+                                        <p:tgtEl>
+                                          <p:spTgt spid="6">
+                                            <p:txEl>
+                                              <p:pRg st="2" end="2"/>
+                                            </p:txEl>
+                                          </p:spTgt>
+                                        </p:tgtEl>
+                                      </p:cBhvr>
+                                    </p:animEffect>
+                                  </p:childTnLst>
+                                </p:cTn>
+                              </p:par>
+                            </p:childTnLst>
+                          </p:cTn>
+                        </p:par>
+                      </p:childTnLst>
+                    </p:cTn>
+                  </p:par>
+                  <p:par>
+                    <p:cTn id="20" fill="hold">
+                      <p:stCondLst>
+                        <p:cond delay="indefinite"/>
+                      </p:stCondLst>
+                      <p:childTnLst>
+                        <p:par>
+                          <p:cTn id="21" fill="hold">
+                            <p:stCondLst>
+                              <p:cond delay="0"/>
+                            </p:stCondLst>
+                            <p:childTnLst>
+                              <p:par>
+                                <p:cTn id="22" presetID="13" presetClass="entr" presetSubtype="16" fill="hold" grpId="0" nodeType="clickEffect">
+                                  <p:stCondLst>
+                                    <p:cond delay="0"/>
+                                  </p:stCondLst>
+                                  <p:childTnLst>
+                                    <p:set>
+                                      <p:cBhvr>
+                                        <p:cTn id="23" dur="1" fill="hold">
+                                          <p:stCondLst>
+                                            <p:cond delay="0"/>
+                                          </p:stCondLst>
+                                        </p:cTn>
+                                        <p:tgtEl>
+                                          <p:spTgt spid="6">
+                                            <p:txEl>
+                                              <p:pRg st="4" end="4"/>
+                                            </p:txEl>
+                                          </p:spTgt>
+                                        </p:tgtEl>
+                                        <p:attrNameLst>
+                                          <p:attrName>style.visibility</p:attrName>
+                                        </p:attrNameLst>
+                                      </p:cBhvr>
+                                      <p:to>
+                                        <p:strVal val="visible"/>
+                                      </p:to>
+                                    </p:set>
+                                    <p:animEffect transition="in" filter="plus(in)">
+                                      <p:cBhvr>
+                                        <p:cTn id="24" dur="2000"/>
+                                        <p:tgtEl>
+                                          <p:spTgt spid="6">
+                                            <p:txEl>
+                                              <p:pRg st="4" end="4"/>
+                                            </p:txEl>
+                                          </p:spTgt>
+                                        </p:tgtEl>
+                                      </p:cBhvr>
+                                    </p:animEffect>
+                                  </p:childTnLst>
+                                </p:cTn>
+                              </p:par>
+                            </p:childTnLst>
+                          </p:cTn>
+                        </p:par>
+                      </p:childTnLst>
+                    </p:cTn>
+                  </p:par>
+                  <p:par>
+                    <p:cTn id="25" fill="hold">
+                      <p:stCondLst>
+                        <p:cond delay="indefinite"/>
+                      </p:stCondLst>
+                      <p:childTnLst>
+                        <p:par>
+                          <p:cTn id="26" fill="hold">
+                            <p:stCondLst>
+                              <p:cond delay="0"/>
+                            </p:stCondLst>
+                            <p:childTnLst>
+                              <p:par>
+                                <p:cTn id="27" presetID="42" presetClass="entr" presetSubtype="0" fill="hold" grpId="0" nodeType="clickEffect">
+                                  <p:stCondLst>
+                                    <p:cond delay="0"/>
+                                  </p:stCondLst>
+                                  <p:childTnLst>
+                                    <p:set>
+                                      <p:cBhvr>
+                                        <p:cTn id="28" dur="1" fill="hold">
+                                          <p:stCondLst>
+                                            <p:cond delay="0"/>
+                                          </p:stCondLst>
+                                        </p:cTn>
+                                        <p:tgtEl>
+                                          <p:spTgt spid="7">
+                                            <p:txEl>
+                                              <p:pRg st="0" end="0"/>
+                                            </p:txEl>
+                                          </p:spTgt>
+                                        </p:tgtEl>
+                                        <p:attrNameLst>
+                                          <p:attrName>style.visibility</p:attrName>
+                                        </p:attrNameLst>
+                                      </p:cBhvr>
+                                      <p:to>
+                                        <p:strVal val="visible"/>
+                                      </p:to>
+                                    </p:set>
+                                    <p:animEffect transition="in" filter="fade">
+                                      <p:cBhvr>
+                                        <p:cTn id="29" dur="1000"/>
+                                        <p:tgtEl>
+                                          <p:spTgt spid="7">
+                                            <p:txEl>
+                                              <p:pRg st="0" end="0"/>
+                                            </p:txEl>
+                                          </p:spTgt>
+                                        </p:tgtEl>
+                                      </p:cBhvr>
+                                    </p:animEffect>
+                                    <p:anim calcmode="lin" valueType="num">
+                                      <p:cBhvr>
+                                        <p:cTn id="30" dur="1000" fill="hold"/>
+                                        <p:tgtEl>
+                                          <p:spTgt spid="7">
+                                            <p:txEl>
+                                              <p:pRg st="0" end="0"/>
+                                            </p:txEl>
+                                          </p:spTgt>
+                                        </p:tgtEl>
+                                        <p:attrNameLst>
+                                          <p:attrName>ppt_x</p:attrName>
+                                        </p:attrNameLst>
+                                      </p:cBhvr>
+                                      <p:tavLst>
+                                        <p:tav tm="0">
+                                          <p:val>
+                                            <p:strVal val="#ppt_x"/>
+                                          </p:val>
+                                        </p:tav>
+                                        <p:tav tm="100000">
+                                          <p:val>
+                                            <p:strVal val="#ppt_x"/>
+                                          </p:val>
+                                        </p:tav>
+                                      </p:tavLst>
+                                    </p:anim>
+                                    <p:anim calcmode="lin" valueType="num">
+                                      <p:cBhvr>
+                                        <p:cTn id="31" dur="1000" fill="hold"/>
+                                        <p:tgtEl>
+                                          <p:spTgt spid="7">
+                                            <p:txEl>
+                                              <p:pRg st="0" end="0"/>
+                                            </p:txEl>
+                                          </p:spTgt>
+                                        </p:tgtEl>
+                                        <p:attrNameLst>
+                                          <p:attrName>ppt_y</p:attrName>
+                                        </p:attrNameLst>
+                                      </p:cBhvr>
+                                      <p:tavLst>
+                                        <p:tav tm="0">
+                                          <p:val>
+                                            <p:strVal val="#ppt_y+.1"/>
+                                          </p:val>
+                                        </p:tav>
+                                        <p:tav tm="100000">
+                                          <p:val>
+                                            <p:strVal val="#ppt_y"/>
+                                          </p:val>
+                                        </p:tav>
+                                      </p:tavLst>
+                                    </p:anim>
+                                  </p:childTnLst>
+                                </p:cTn>
+                              </p:par>
+                            </p:childTnLst>
+                          </p:cTn>
+                        </p:par>
+                      </p:childTnLst>
+                    </p:cTn>
+                  </p:par>
+                  <p:par>
+                    <p:cTn id="32" fill="hold">
+                      <p:stCondLst>
+                        <p:cond delay="indefinite"/>
+                      </p:stCondLst>
+                      <p:childTnLst>
+                        <p:par>
+                          <p:cTn id="33" fill="hold">
+                            <p:stCondLst>
+                              <p:cond delay="0"/>
+                            </p:stCondLst>
+                            <p:childTnLst>
+                              <p:par>
+                                <p:cTn id="34" presetID="13" presetClass="entr" presetSubtype="16" fill="hold" grpId="0" nodeType="clickEffect">
+                                  <p:stCondLst>
+                                    <p:cond delay="0"/>
+                                  </p:stCondLst>
+                                  <p:childTnLst>
+                                    <p:set>
+                                      <p:cBhvr>
+                                        <p:cTn id="35" dur="1" fill="hold">
+                                          <p:stCondLst>
+                                            <p:cond delay="0"/>
+                                          </p:stCondLst>
+                                        </p:cTn>
+                                        <p:tgtEl>
+                                          <p:spTgt spid="8">
+                                            <p:txEl>
+                                              <p:pRg st="0" end="0"/>
+                                            </p:txEl>
+                                          </p:spTgt>
+                                        </p:tgtEl>
+                                        <p:attrNameLst>
+                                          <p:attrName>style.visibility</p:attrName>
+                                        </p:attrNameLst>
+                                      </p:cBhvr>
+                                      <p:to>
+                                        <p:strVal val="visible"/>
+                                      </p:to>
+                                    </p:set>
+                                    <p:animEffect transition="in" filter="plus(in)">
+                                      <p:cBhvr>
+                                        <p:cTn id="36" dur="2000"/>
+                                        <p:tgtEl>
+                                          <p:spTgt spid="8">
+                                            <p:txEl>
+                                              <p:pRg st="0" end="0"/>
+                                            </p:txEl>
+                                          </p:spTgt>
+                                        </p:tgtEl>
+                                      </p:cBhvr>
+                                    </p:animEffect>
+                                  </p:childTnLst>
+                                </p:cTn>
+                              </p:par>
+                            </p:childTnLst>
+                          </p:cTn>
+                        </p:par>
+                      </p:childTnLst>
+                    </p:cTn>
+                  </p:par>
+                  <p:par>
+                    <p:cTn id="37" fill="hold">
+                      <p:stCondLst>
+                        <p:cond delay="indefinite"/>
+                      </p:stCondLst>
+                      <p:childTnLst>
+                        <p:par>
+                          <p:cTn id="38" fill="hold">
+                            <p:stCondLst>
+                              <p:cond delay="0"/>
+                            </p:stCondLst>
+                            <p:childTnLst>
+                              <p:par>
+                                <p:cTn id="39" presetID="13" presetClass="entr" presetSubtype="16" fill="hold" grpId="0" nodeType="clickEffect">
+                                  <p:stCondLst>
+                                    <p:cond delay="0"/>
+                                  </p:stCondLst>
+                                  <p:childTnLst>
+                                    <p:set>
+                                      <p:cBhvr>
+                                        <p:cTn id="40" dur="1" fill="hold">
+                                          <p:stCondLst>
+                                            <p:cond delay="0"/>
+                                          </p:stCondLst>
+                                        </p:cTn>
+                                        <p:tgtEl>
+                                          <p:spTgt spid="8">
+                                            <p:txEl>
+                                              <p:pRg st="2" end="2"/>
+                                            </p:txEl>
+                                          </p:spTgt>
+                                        </p:tgtEl>
+                                        <p:attrNameLst>
+                                          <p:attrName>style.visibility</p:attrName>
+                                        </p:attrNameLst>
+                                      </p:cBhvr>
+                                      <p:to>
+                                        <p:strVal val="visible"/>
+                                      </p:to>
+                                    </p:set>
+                                    <p:animEffect transition="in" filter="plus(in)">
+                                      <p:cBhvr>
+                                        <p:cTn id="41" dur="2000"/>
+                                        <p:tgtEl>
+                                          <p:spTgt spid="8">
+                                            <p:txEl>
+                                              <p:pRg st="2" end="2"/>
+                                            </p:txEl>
+                                          </p:spTgt>
+                                        </p:tgtEl>
+                                      </p:cBhvr>
+                                    </p:animEffect>
+                                  </p:childTnLst>
+                                </p:cTn>
+                              </p:par>
+                            </p:childTnLst>
+                          </p:cTn>
+                        </p:par>
+                      </p:childTnLst>
+                    </p:cTn>
+                  </p:par>
+                </p:childTnLst>
+              </p:cTn>
+              <p:prevCondLst>
+                <p:cond evt="onPrev" delay="0">
+                  <p:tgtEl>
+                    <p:sldTgt/>
+                  </p:tgtEl>
+                </p:cond>
+              </p:prevCondLst>
+              <p:nextCondLst>
+                <p:cond evt="onNext" delay="0">
+                  <p:tgtEl>
+                    <p:sldTgt/>
+                  </p:tgtEl>
+                </p:cond>
+              </p:nextCondLst>
+            </p:seq>
+          </p:childTnLst>
+        </p:cTn>
       </p:par>
     </p:tnLst>
+    <p:bldLst>
+      <p:bldP spid="8" grpId="0" build="p"/>
+      <p:bldP spid="7" grpId="0" build="p"/>
+      <p:bldP spid="6" grpId="0" build="p"/>
+      <p:bldP spid="5" grpId="0" build="p"/>
+    </p:bldLst>
   </p:timing>
 </p:sld>
 </file>
@@ -10158,6 +11215,13 @@
       </p:transition>
     </mc:Fallback>
   </mc:AlternateContent>
+  <p:timing>
+    <p:tnLst>
+      <p:par>
+        <p:cTn id="1" dur="indefinite" restart="never" nodeType="tmRoot"/>
+      </p:par>
+    </p:tnLst>
+  </p:timing>
 </p:sld>
 </file>
 

</xml_diff>

<commit_message>
added animation to more slides
removed the rob Copy because it didn't work
</commit_message>
<xml_diff>
--- a/I Choose You.pptx
+++ b/I Choose You.pptx
@@ -4256,7 +4256,7 @@
           <a:p>
             <a:fld id="{41658A34-83F4-4B2E-BC5A-DE51EE8822F9}" type="datetimeFigureOut">
               <a:rPr lang="en-US" smtClean="0"/>
-              <a:t>4/26/2015</a:t>
+              <a:t>4/27/2015</a:t>
             </a:fld>
             <a:endParaRPr lang="en-US"/>
           </a:p>
@@ -4421,7 +4421,7 @@
           <a:p>
             <a:fld id="{7F2E1917-0BAF-4687-978A-82FFF05559C3}" type="datetimeFigureOut">
               <a:rPr lang="en-US" smtClean="0"/>
-              <a:t>4/26/2015</a:t>
+              <a:t>4/27/2015</a:t>
             </a:fld>
             <a:endParaRPr lang="en-US"/>
           </a:p>
@@ -4940,7 +4940,21 @@
           <a:p>
             <a:r>
               <a:rPr lang="en-US" dirty="0" smtClean="0"/>
-              <a:t>Kevin should talk about this</a:t>
+              <a:t>Kevin should talk about </a:t>
+            </a:r>
+            <a:r>
+              <a:rPr lang="en-US" dirty="0" smtClean="0"/>
+              <a:t>this. I should record what he says so I can put it in the paper later</a:t>
+            </a:r>
+            <a:r>
+              <a:rPr lang="en-US" baseline="0" dirty="0" smtClean="0"/>
+              <a:t> </a:t>
+            </a:r>
+            <a:r>
+              <a:rPr lang="en-US" baseline="0" dirty="0" smtClean="0">
+                <a:sym typeface="Wingdings" panose="05000000000000000000" pitchFamily="2" charset="2"/>
+              </a:rPr>
+              <a:t></a:t>
             </a:r>
             <a:endParaRPr lang="en-US" dirty="0"/>
           </a:p>
@@ -5549,7 +5563,7 @@
           <a:p>
             <a:fld id="{84EAB7D7-3608-4730-B2E2-670834DF882C}" type="datetimeFigureOut">
               <a:rPr lang="en-US" smtClean="0"/>
-              <a:t>4/26/2015</a:t>
+              <a:t>4/27/2015</a:t>
             </a:fld>
             <a:endParaRPr lang="en-US"/>
           </a:p>
@@ -5757,7 +5771,7 @@
           <a:p>
             <a:fld id="{84EAB7D7-3608-4730-B2E2-670834DF882C}" type="datetimeFigureOut">
               <a:rPr lang="en-US" smtClean="0"/>
-              <a:t>4/26/2015</a:t>
+              <a:t>4/27/2015</a:t>
             </a:fld>
             <a:endParaRPr lang="en-US"/>
           </a:p>
@@ -5944,7 +5958,7 @@
           <a:p>
             <a:fld id="{84EAB7D7-3608-4730-B2E2-670834DF882C}" type="datetimeFigureOut">
               <a:rPr lang="en-US" smtClean="0"/>
-              <a:t>4/26/2015</a:t>
+              <a:t>4/27/2015</a:t>
             </a:fld>
             <a:endParaRPr lang="en-US"/>
           </a:p>
@@ -6136,7 +6150,7 @@
           <a:p>
             <a:fld id="{84EAB7D7-3608-4730-B2E2-670834DF882C}" type="datetimeFigureOut">
               <a:rPr lang="en-US" smtClean="0"/>
-              <a:t>4/26/2015</a:t>
+              <a:t>4/27/2015</a:t>
             </a:fld>
             <a:endParaRPr lang="en-US"/>
           </a:p>
@@ -6405,7 +6419,7 @@
           <a:p>
             <a:fld id="{84EAB7D7-3608-4730-B2E2-670834DF882C}" type="datetimeFigureOut">
               <a:rPr lang="en-US" smtClean="0"/>
-              <a:t>4/26/2015</a:t>
+              <a:t>4/27/2015</a:t>
             </a:fld>
             <a:endParaRPr lang="en-US"/>
           </a:p>
@@ -6587,7 +6601,7 @@
           <a:p>
             <a:fld id="{84EAB7D7-3608-4730-B2E2-670834DF882C}" type="datetimeFigureOut">
               <a:rPr lang="en-US" smtClean="0"/>
-              <a:t>4/26/2015</a:t>
+              <a:t>4/27/2015</a:t>
             </a:fld>
             <a:endParaRPr lang="en-US"/>
           </a:p>
@@ -6791,7 +6805,7 @@
           <a:p>
             <a:fld id="{84EAB7D7-3608-4730-B2E2-670834DF882C}" type="datetimeFigureOut">
               <a:rPr lang="en-US" smtClean="0"/>
-              <a:t>4/26/2015</a:t>
+              <a:t>4/27/2015</a:t>
             </a:fld>
             <a:endParaRPr lang="en-US"/>
           </a:p>
@@ -7091,7 +7105,7 @@
           <a:p>
             <a:fld id="{84EAB7D7-3608-4730-B2E2-670834DF882C}" type="datetimeFigureOut">
               <a:rPr lang="en-US" smtClean="0"/>
-              <a:t>4/26/2015</a:t>
+              <a:t>4/27/2015</a:t>
             </a:fld>
             <a:endParaRPr lang="en-US"/>
           </a:p>
@@ -7542,7 +7556,7 @@
           <a:p>
             <a:fld id="{84EAB7D7-3608-4730-B2E2-670834DF882C}" type="datetimeFigureOut">
               <a:rPr lang="en-US" smtClean="0"/>
-              <a:t>4/26/2015</a:t>
+              <a:t>4/27/2015</a:t>
             </a:fld>
             <a:endParaRPr lang="en-US"/>
           </a:p>
@@ -7672,7 +7686,7 @@
           <a:p>
             <a:fld id="{84EAB7D7-3608-4730-B2E2-670834DF882C}" type="datetimeFigureOut">
               <a:rPr lang="en-US" smtClean="0"/>
-              <a:t>4/26/2015</a:t>
+              <a:t>4/27/2015</a:t>
             </a:fld>
             <a:endParaRPr lang="en-US"/>
           </a:p>
@@ -7779,7 +7793,7 @@
           <a:p>
             <a:fld id="{84EAB7D7-3608-4730-B2E2-670834DF882C}" type="datetimeFigureOut">
               <a:rPr lang="en-US" smtClean="0"/>
-              <a:t>4/26/2015</a:t>
+              <a:t>4/27/2015</a:t>
             </a:fld>
             <a:endParaRPr lang="en-US"/>
           </a:p>
@@ -8068,7 +8082,7 @@
           <a:p>
             <a:fld id="{84EAB7D7-3608-4730-B2E2-670834DF882C}" type="datetimeFigureOut">
               <a:rPr lang="en-US" smtClean="0"/>
-              <a:t>4/26/2015</a:t>
+              <a:t>4/27/2015</a:t>
             </a:fld>
             <a:endParaRPr lang="en-US"/>
           </a:p>
@@ -8370,7 +8384,7 @@
             <a:fld id="{84EAB7D7-3608-4730-B2E2-670834DF882C}" type="datetimeFigureOut">
               <a:rPr lang="en-US" smtClean="0"/>
               <a:pPr/>
-              <a:t>4/26/2015</a:t>
+              <a:t>4/27/2015</a:t>
             </a:fld>
             <a:endParaRPr lang="en-US"/>
           </a:p>
@@ -9042,13 +9056,13 @@
   <p:clrMapOvr>
     <a:masterClrMapping/>
   </p:clrMapOvr>
-  <mc:AlternateContent xmlns:mc="http://schemas.openxmlformats.org/markup-compatibility/2006">
-    <mc:Choice xmlns:p14="http://schemas.microsoft.com/office/powerpoint/2010/main" Requires="p14">
+  <mc:AlternateContent xmlns:mc="http://schemas.openxmlformats.org/markup-compatibility/2006" xmlns:p14="http://schemas.microsoft.com/office/powerpoint/2010/main">
+    <mc:Choice Requires="p14">
       <p:transition spd="slow" p14:dur="2000">
         <p:pull/>
       </p:transition>
     </mc:Choice>
-    <mc:Fallback>
+    <mc:Fallback xmlns="">
       <p:transition spd="slow">
         <p:pull/>
       </p:transition>
@@ -9530,13 +9544,13 @@
   <p:clrMapOvr>
     <a:masterClrMapping/>
   </p:clrMapOvr>
-  <mc:AlternateContent xmlns:mc="http://schemas.openxmlformats.org/markup-compatibility/2006">
-    <mc:Choice xmlns:p14="http://schemas.microsoft.com/office/powerpoint/2010/main" Requires="p14">
+  <mc:AlternateContent xmlns:mc="http://schemas.openxmlformats.org/markup-compatibility/2006" xmlns:p14="http://schemas.microsoft.com/office/powerpoint/2010/main">
+    <mc:Choice Requires="p14">
       <p:transition spd="slow" p14:dur="800">
         <p:circle/>
       </p:transition>
     </mc:Choice>
-    <mc:Fallback>
+    <mc:Fallback xmlns="">
       <p:transition spd="slow">
         <p:circle/>
       </p:transition>
@@ -10055,9 +10069,280 @@
   <p:timing>
     <p:tnLst>
       <p:par>
-        <p:cTn id="1" dur="indefinite" restart="never" nodeType="tmRoot"/>
+        <p:cTn id="1" dur="indefinite" restart="never" nodeType="tmRoot">
+          <p:childTnLst>
+            <p:seq concurrent="1" nextAc="seek">
+              <p:cTn id="2" dur="indefinite" nodeType="mainSeq">
+                <p:childTnLst>
+                  <p:par>
+                    <p:cTn id="3" fill="hold">
+                      <p:stCondLst>
+                        <p:cond delay="indefinite"/>
+                      </p:stCondLst>
+                      <p:childTnLst>
+                        <p:par>
+                          <p:cTn id="4" fill="hold">
+                            <p:stCondLst>
+                              <p:cond delay="0"/>
+                            </p:stCondLst>
+                            <p:childTnLst>
+                              <p:par>
+                                <p:cTn id="5" presetID="9" presetClass="entr" presetSubtype="0" fill="hold" grpId="0" nodeType="clickEffect">
+                                  <p:stCondLst>
+                                    <p:cond delay="0"/>
+                                  </p:stCondLst>
+                                  <p:childTnLst>
+                                    <p:set>
+                                      <p:cBhvr>
+                                        <p:cTn id="6" dur="1" fill="hold">
+                                          <p:stCondLst>
+                                            <p:cond delay="0"/>
+                                          </p:stCondLst>
+                                        </p:cTn>
+                                        <p:tgtEl>
+                                          <p:spTgt spid="16">
+                                            <p:txEl>
+                                              <p:pRg st="0" end="0"/>
+                                            </p:txEl>
+                                          </p:spTgt>
+                                        </p:tgtEl>
+                                        <p:attrNameLst>
+                                          <p:attrName>style.visibility</p:attrName>
+                                        </p:attrNameLst>
+                                      </p:cBhvr>
+                                      <p:to>
+                                        <p:strVal val="visible"/>
+                                      </p:to>
+                                    </p:set>
+                                    <p:animEffect transition="in" filter="dissolve">
+                                      <p:cBhvr>
+                                        <p:cTn id="7" dur="2000"/>
+                                        <p:tgtEl>
+                                          <p:spTgt spid="16">
+                                            <p:txEl>
+                                              <p:pRg st="0" end="0"/>
+                                            </p:txEl>
+                                          </p:spTgt>
+                                        </p:tgtEl>
+                                      </p:cBhvr>
+                                    </p:animEffect>
+                                  </p:childTnLst>
+                                </p:cTn>
+                              </p:par>
+                            </p:childTnLst>
+                          </p:cTn>
+                        </p:par>
+                      </p:childTnLst>
+                    </p:cTn>
+                  </p:par>
+                  <p:par>
+                    <p:cTn id="8" fill="hold">
+                      <p:stCondLst>
+                        <p:cond delay="indefinite"/>
+                      </p:stCondLst>
+                      <p:childTnLst>
+                        <p:par>
+                          <p:cTn id="9" fill="hold">
+                            <p:stCondLst>
+                              <p:cond delay="0"/>
+                            </p:stCondLst>
+                            <p:childTnLst>
+                              <p:par>
+                                <p:cTn id="10" presetID="9" presetClass="entr" presetSubtype="0" fill="hold" grpId="0" nodeType="clickEffect">
+                                  <p:stCondLst>
+                                    <p:cond delay="0"/>
+                                  </p:stCondLst>
+                                  <p:childTnLst>
+                                    <p:set>
+                                      <p:cBhvr>
+                                        <p:cTn id="11" dur="1" fill="hold">
+                                          <p:stCondLst>
+                                            <p:cond delay="0"/>
+                                          </p:stCondLst>
+                                        </p:cTn>
+                                        <p:tgtEl>
+                                          <p:spTgt spid="16">
+                                            <p:txEl>
+                                              <p:pRg st="2" end="2"/>
+                                            </p:txEl>
+                                          </p:spTgt>
+                                        </p:tgtEl>
+                                        <p:attrNameLst>
+                                          <p:attrName>style.visibility</p:attrName>
+                                        </p:attrNameLst>
+                                      </p:cBhvr>
+                                      <p:to>
+                                        <p:strVal val="visible"/>
+                                      </p:to>
+                                    </p:set>
+                                    <p:animEffect transition="in" filter="dissolve">
+                                      <p:cBhvr>
+                                        <p:cTn id="12" dur="2000"/>
+                                        <p:tgtEl>
+                                          <p:spTgt spid="16">
+                                            <p:txEl>
+                                              <p:pRg st="2" end="2"/>
+                                            </p:txEl>
+                                          </p:spTgt>
+                                        </p:tgtEl>
+                                      </p:cBhvr>
+                                    </p:animEffect>
+                                  </p:childTnLst>
+                                </p:cTn>
+                              </p:par>
+                            </p:childTnLst>
+                          </p:cTn>
+                        </p:par>
+                      </p:childTnLst>
+                    </p:cTn>
+                  </p:par>
+                  <p:par>
+                    <p:cTn id="13" fill="hold">
+                      <p:stCondLst>
+                        <p:cond delay="indefinite"/>
+                      </p:stCondLst>
+                      <p:childTnLst>
+                        <p:par>
+                          <p:cTn id="14" fill="hold">
+                            <p:stCondLst>
+                              <p:cond delay="0"/>
+                            </p:stCondLst>
+                            <p:childTnLst>
+                              <p:par>
+                                <p:cTn id="15" presetID="9" presetClass="entr" presetSubtype="0" fill="hold" grpId="0" nodeType="clickEffect">
+                                  <p:stCondLst>
+                                    <p:cond delay="0"/>
+                                  </p:stCondLst>
+                                  <p:childTnLst>
+                                    <p:set>
+                                      <p:cBhvr>
+                                        <p:cTn id="16" dur="1" fill="hold">
+                                          <p:stCondLst>
+                                            <p:cond delay="0"/>
+                                          </p:stCondLst>
+                                        </p:cTn>
+                                        <p:tgtEl>
+                                          <p:spTgt spid="2">
+                                            <p:txEl>
+                                              <p:pRg st="0" end="0"/>
+                                            </p:txEl>
+                                          </p:spTgt>
+                                        </p:tgtEl>
+                                        <p:attrNameLst>
+                                          <p:attrName>style.visibility</p:attrName>
+                                        </p:attrNameLst>
+                                      </p:cBhvr>
+                                      <p:to>
+                                        <p:strVal val="visible"/>
+                                      </p:to>
+                                    </p:set>
+                                    <p:animEffect transition="in" filter="dissolve">
+                                      <p:cBhvr>
+                                        <p:cTn id="17" dur="500"/>
+                                        <p:tgtEl>
+                                          <p:spTgt spid="2">
+                                            <p:txEl>
+                                              <p:pRg st="0" end="0"/>
+                                            </p:txEl>
+                                          </p:spTgt>
+                                        </p:tgtEl>
+                                      </p:cBhvr>
+                                    </p:animEffect>
+                                  </p:childTnLst>
+                                </p:cTn>
+                              </p:par>
+                            </p:childTnLst>
+                          </p:cTn>
+                        </p:par>
+                      </p:childTnLst>
+                    </p:cTn>
+                  </p:par>
+                  <p:par>
+                    <p:cTn id="18" fill="hold">
+                      <p:stCondLst>
+                        <p:cond delay="indefinite"/>
+                      </p:stCondLst>
+                      <p:childTnLst>
+                        <p:par>
+                          <p:cTn id="19" fill="hold">
+                            <p:stCondLst>
+                              <p:cond delay="0"/>
+                            </p:stCondLst>
+                            <p:childTnLst>
+                              <p:par>
+                                <p:cTn id="20" presetID="9" presetClass="entr" presetSubtype="0" fill="hold" grpId="0" nodeType="clickEffect">
+                                  <p:stCondLst>
+                                    <p:cond delay="0"/>
+                                  </p:stCondLst>
+                                  <p:childTnLst>
+                                    <p:set>
+                                      <p:cBhvr>
+                                        <p:cTn id="21" dur="1" fill="hold">
+                                          <p:stCondLst>
+                                            <p:cond delay="0"/>
+                                          </p:stCondLst>
+                                        </p:cTn>
+                                        <p:tgtEl>
+                                          <p:spTgt spid="2">
+                                            <p:txEl>
+                                              <p:pRg st="2" end="2"/>
+                                            </p:txEl>
+                                          </p:spTgt>
+                                        </p:tgtEl>
+                                        <p:attrNameLst>
+                                          <p:attrName>style.visibility</p:attrName>
+                                        </p:attrNameLst>
+                                      </p:cBhvr>
+                                      <p:to>
+                                        <p:strVal val="visible"/>
+                                      </p:to>
+                                    </p:set>
+                                    <p:animEffect transition="in" filter="dissolve">
+                                      <p:cBhvr>
+                                        <p:cTn id="22" dur="2000"/>
+                                        <p:tgtEl>
+                                          <p:spTgt spid="2">
+                                            <p:txEl>
+                                              <p:pRg st="2" end="2"/>
+                                            </p:txEl>
+                                          </p:spTgt>
+                                        </p:tgtEl>
+                                      </p:cBhvr>
+                                    </p:animEffect>
+                                  </p:childTnLst>
+                                </p:cTn>
+                              </p:par>
+                            </p:childTnLst>
+                          </p:cTn>
+                        </p:par>
+                      </p:childTnLst>
+                    </p:cTn>
+                  </p:par>
+                </p:childTnLst>
+              </p:cTn>
+              <p:prevCondLst>
+                <p:cond evt="onPrev" delay="0">
+                  <p:tgtEl>
+                    <p:sldTgt/>
+                  </p:tgtEl>
+                </p:cond>
+              </p:prevCondLst>
+              <p:nextCondLst>
+                <p:cond evt="onNext" delay="0">
+                  <p:tgtEl>
+                    <p:sldTgt/>
+                  </p:tgtEl>
+                </p:cond>
+              </p:nextCondLst>
+            </p:seq>
+          </p:childTnLst>
+        </p:cTn>
       </p:par>
     </p:tnLst>
+    <p:bldLst>
+      <p:bldP spid="2" grpId="0" build="p"/>
+      <p:bldP spid="16" grpId="0" build="p"/>
+    </p:bldLst>
   </p:timing>
 </p:sld>
 </file>

</xml_diff>